<commit_message>
PresProyfinal.pptx Actualizada y modificada
</commit_message>
<xml_diff>
--- a/Proyecto final/Exposiciones/PresProyfinal.pptx
+++ b/Proyecto final/Exposiciones/PresProyfinal.pptx
@@ -5,7 +5,7 @@
     <p:sldMasterId id="2147483648" r:id="rId1"/>
   </p:sldMasterIdLst>
   <p:notesMasterIdLst>
-    <p:notesMasterId r:id="rId22"/>
+    <p:notesMasterId r:id="rId23"/>
   </p:notesMasterIdLst>
   <p:sldIdLst>
     <p:sldId id="256" r:id="rId2"/>
@@ -17,17 +17,18 @@
     <p:sldId id="262" r:id="rId8"/>
     <p:sldId id="263" r:id="rId9"/>
     <p:sldId id="264" r:id="rId10"/>
-    <p:sldId id="265" r:id="rId11"/>
-    <p:sldId id="267" r:id="rId12"/>
-    <p:sldId id="269" r:id="rId13"/>
-    <p:sldId id="268" r:id="rId14"/>
-    <p:sldId id="270" r:id="rId15"/>
-    <p:sldId id="271" r:id="rId16"/>
-    <p:sldId id="272" r:id="rId17"/>
-    <p:sldId id="274" r:id="rId18"/>
-    <p:sldId id="266" r:id="rId19"/>
-    <p:sldId id="275" r:id="rId20"/>
-    <p:sldId id="276" r:id="rId21"/>
+    <p:sldId id="277" r:id="rId11"/>
+    <p:sldId id="278" r:id="rId12"/>
+    <p:sldId id="267" r:id="rId13"/>
+    <p:sldId id="269" r:id="rId14"/>
+    <p:sldId id="268" r:id="rId15"/>
+    <p:sldId id="270" r:id="rId16"/>
+    <p:sldId id="271" r:id="rId17"/>
+    <p:sldId id="272" r:id="rId18"/>
+    <p:sldId id="274" r:id="rId19"/>
+    <p:sldId id="266" r:id="rId20"/>
+    <p:sldId id="275" r:id="rId21"/>
+    <p:sldId id="276" r:id="rId22"/>
   </p:sldIdLst>
   <p:sldSz cx="9144000" cy="6858000" type="screen4x3"/>
   <p:notesSz cx="6858000" cy="9144000"/>
@@ -751,12 +752,60 @@
           <a:lstStyle/>
           <a:p>
             <a:r>
-              <a:rPr lang="es-AR" dirty="0" smtClean="0"/>
-              <a:t>El</a:t>
-            </a:r>
-            <a:r>
-              <a:rPr lang="es-AR" baseline="0" dirty="0" smtClean="0"/>
-              <a:t> impacto es empleado en los cliente para que los mismos puedan realizar un</a:t>
+              <a:rPr lang="es-AR" sz="1200" b="1" i="0" kern="1200" dirty="0" smtClean="0">
+                <a:solidFill>
+                  <a:schemeClr val="tx1"/>
+                </a:solidFill>
+                <a:latin typeface="+mn-lt"/>
+                <a:ea typeface="+mn-ea"/>
+                <a:cs typeface="+mn-cs"/>
+              </a:rPr>
+              <a:t>FINALIZA VIDEO</a:t>
+            </a:r>
+          </a:p>
+          <a:p>
+            <a:endParaRPr lang="es-AR" sz="1200" b="1" i="0" kern="1200" dirty="0" smtClean="0">
+              <a:solidFill>
+                <a:schemeClr val="tx1"/>
+              </a:solidFill>
+              <a:latin typeface="+mn-lt"/>
+              <a:ea typeface="+mn-ea"/>
+              <a:cs typeface="+mn-cs"/>
+            </a:endParaRPr>
+          </a:p>
+          <a:p>
+            <a:r>
+              <a:rPr lang="es-AR" sz="1200" b="0" i="0" kern="1200" dirty="0" smtClean="0">
+                <a:solidFill>
+                  <a:schemeClr val="tx1"/>
+                </a:solidFill>
+                <a:latin typeface="+mn-lt"/>
+                <a:ea typeface="+mn-ea"/>
+                <a:cs typeface="+mn-cs"/>
+              </a:rPr>
+              <a:t>“</a:t>
+            </a:r>
+            <a:r>
+              <a:rPr lang="es-AR" sz="1200" b="0" i="0" kern="1200" dirty="0" err="1" smtClean="0">
+                <a:solidFill>
+                  <a:schemeClr val="tx1"/>
+                </a:solidFill>
+                <a:latin typeface="+mn-lt"/>
+                <a:ea typeface="+mn-ea"/>
+                <a:cs typeface="+mn-cs"/>
+              </a:rPr>
+              <a:t>Optical</a:t>
+            </a:r>
+            <a:r>
+              <a:rPr lang="es-AR" sz="1200" b="0" i="0" kern="1200" dirty="0" smtClean="0">
+                <a:solidFill>
+                  <a:schemeClr val="tx1"/>
+                </a:solidFill>
+                <a:latin typeface="+mn-lt"/>
+                <a:ea typeface="+mn-ea"/>
+                <a:cs typeface="+mn-cs"/>
+              </a:rPr>
+              <a:t> Marketing es la solución tecnológica que brinda información en tiempo real  sobre el impacto de recepción de campañas publicitarias interactivas emitidas por puestos publicitarios específicamente diseñados para realizar análisis de impacto de recepción publicitaria.”</a:t>
             </a:r>
             <a:endParaRPr lang="es-AR" dirty="0"/>
           </a:p>
@@ -1729,6 +1778,96 @@
 </p:notes>
 </file>
 
+<file path=ppt/notesSlides/notesSlide20.xml><?xml version="1.0" encoding="utf-8"?>
+<p:notes xmlns:a="http://schemas.openxmlformats.org/drawingml/2006/main" xmlns:r="http://schemas.openxmlformats.org/officeDocument/2006/relationships" xmlns:p="http://schemas.openxmlformats.org/presentationml/2006/main">
+  <p:cSld>
+    <p:spTree>
+      <p:nvGrpSpPr>
+        <p:cNvPr id="1" name=""/>
+        <p:cNvGrpSpPr/>
+        <p:nvPr/>
+      </p:nvGrpSpPr>
+      <p:grpSpPr>
+        <a:xfrm>
+          <a:off x="0" y="0"/>
+          <a:ext cx="0" cy="0"/>
+          <a:chOff x="0" y="0"/>
+          <a:chExt cx="0" cy="0"/>
+        </a:xfrm>
+      </p:grpSpPr>
+      <p:sp>
+        <p:nvSpPr>
+          <p:cNvPr id="2" name="1 Marcador de imagen de diapositiva"/>
+          <p:cNvSpPr>
+            <a:spLocks noGrp="1" noRot="1" noChangeAspect="1"/>
+          </p:cNvSpPr>
+          <p:nvPr>
+            <p:ph type="sldImg"/>
+          </p:nvPr>
+        </p:nvSpPr>
+        <p:spPr/>
+      </p:sp>
+      <p:sp>
+        <p:nvSpPr>
+          <p:cNvPr id="3" name="2 Marcador de notas"/>
+          <p:cNvSpPr>
+            <a:spLocks noGrp="1"/>
+          </p:cNvSpPr>
+          <p:nvPr>
+            <p:ph type="body" idx="1"/>
+          </p:nvPr>
+        </p:nvSpPr>
+        <p:spPr/>
+        <p:txBody>
+          <a:bodyPr>
+            <a:normAutofit/>
+          </a:bodyPr>
+          <a:lstStyle/>
+          <a:p>
+            <a:r>
+              <a:rPr lang="es-AR" dirty="0" smtClean="0"/>
+              <a:t>El</a:t>
+            </a:r>
+            <a:r>
+              <a:rPr lang="es-AR" baseline="0" dirty="0" smtClean="0"/>
+              <a:t> impacto es empleado en los cliente para que los mismos puedan realizar un</a:t>
+            </a:r>
+            <a:endParaRPr lang="es-AR" dirty="0"/>
+          </a:p>
+        </p:txBody>
+      </p:sp>
+      <p:sp>
+        <p:nvSpPr>
+          <p:cNvPr id="4" name="3 Marcador de número de diapositiva"/>
+          <p:cNvSpPr>
+            <a:spLocks noGrp="1"/>
+          </p:cNvSpPr>
+          <p:nvPr>
+            <p:ph type="sldNum" sz="quarter" idx="10"/>
+          </p:nvPr>
+        </p:nvSpPr>
+        <p:spPr/>
+        <p:txBody>
+          <a:bodyPr/>
+          <a:lstStyle/>
+          <a:p>
+            <a:fld id="{1B0ABCE3-A0C1-4665-97DA-4DF4E986969B}" type="slidenum">
+              <a:rPr lang="es-AR" smtClean="0"/>
+              <a:pPr/>
+              <a:t>21</a:t>
+            </a:fld>
+            <a:endParaRPr lang="es-AR"/>
+          </a:p>
+        </p:txBody>
+      </p:sp>
+    </p:spTree>
+  </p:cSld>
+  <p:clrMapOvr>
+    <a:masterClrMapping/>
+  </p:clrMapOvr>
+</p:notes>
+</file>
+
 <file path=ppt/notesSlides/notesSlide3.xml><?xml version="1.0" encoding="utf-8"?>
 <p:notes xmlns:a="http://schemas.openxmlformats.org/drawingml/2006/main" xmlns:r="http://schemas.openxmlformats.org/officeDocument/2006/relationships" xmlns:p="http://schemas.openxmlformats.org/presentationml/2006/main">
   <p:cSld>
@@ -2611,12 +2750,60 @@
           <a:lstStyle/>
           <a:p>
             <a:r>
-              <a:rPr lang="es-AR" dirty="0" smtClean="0"/>
-              <a:t>El</a:t>
-            </a:r>
-            <a:r>
-              <a:rPr lang="es-AR" baseline="0" dirty="0" smtClean="0"/>
-              <a:t> impacto es empleado en los cliente para que los mismos puedan realizar un</a:t>
+              <a:rPr lang="es-AR" sz="1200" b="1" i="0" kern="1200" dirty="0" smtClean="0">
+                <a:solidFill>
+                  <a:schemeClr val="tx1"/>
+                </a:solidFill>
+                <a:latin typeface="+mn-lt"/>
+                <a:ea typeface="+mn-ea"/>
+                <a:cs typeface="+mn-cs"/>
+              </a:rPr>
+              <a:t>FINALIZA VIDEO</a:t>
+            </a:r>
+          </a:p>
+          <a:p>
+            <a:endParaRPr lang="es-AR" sz="1200" b="1" i="0" kern="1200" dirty="0" smtClean="0">
+              <a:solidFill>
+                <a:schemeClr val="tx1"/>
+              </a:solidFill>
+              <a:latin typeface="+mn-lt"/>
+              <a:ea typeface="+mn-ea"/>
+              <a:cs typeface="+mn-cs"/>
+            </a:endParaRPr>
+          </a:p>
+          <a:p>
+            <a:r>
+              <a:rPr lang="es-AR" sz="1200" b="0" i="0" kern="1200" dirty="0" smtClean="0">
+                <a:solidFill>
+                  <a:schemeClr val="tx1"/>
+                </a:solidFill>
+                <a:latin typeface="+mn-lt"/>
+                <a:ea typeface="+mn-ea"/>
+                <a:cs typeface="+mn-cs"/>
+              </a:rPr>
+              <a:t>“</a:t>
+            </a:r>
+            <a:r>
+              <a:rPr lang="es-AR" sz="1200" b="0" i="0" kern="1200" dirty="0" err="1" smtClean="0">
+                <a:solidFill>
+                  <a:schemeClr val="tx1"/>
+                </a:solidFill>
+                <a:latin typeface="+mn-lt"/>
+                <a:ea typeface="+mn-ea"/>
+                <a:cs typeface="+mn-cs"/>
+              </a:rPr>
+              <a:t>Optical</a:t>
+            </a:r>
+            <a:r>
+              <a:rPr lang="es-AR" sz="1200" b="0" i="0" kern="1200" dirty="0" smtClean="0">
+                <a:solidFill>
+                  <a:schemeClr val="tx1"/>
+                </a:solidFill>
+                <a:latin typeface="+mn-lt"/>
+                <a:ea typeface="+mn-ea"/>
+                <a:cs typeface="+mn-cs"/>
+              </a:rPr>
+              <a:t> Marketing es la solución tecnológica que brinda información en tiempo real  sobre el impacto de recepción de campañas publicitarias interactivas emitidas por puestos publicitarios específicamente diseñados para realizar análisis de impacto de recepción publicitaria.”</a:t>
             </a:r>
             <a:endParaRPr lang="es-AR" dirty="0"/>
           </a:p>
@@ -5940,42 +6127,224 @@
           <a:chExt cx="0" cy="0"/>
         </a:xfrm>
       </p:grpSpPr>
-      <p:sp>
-        <p:nvSpPr>
-          <p:cNvPr id="5" name="4 Rectángulo"/>
-          <p:cNvSpPr/>
-          <p:nvPr/>
-        </p:nvSpPr>
+      <p:pic>
+        <p:nvPicPr>
+          <p:cNvPr id="24581" name="Picture 5" descr="D:\ProyectoFinal\Proyecto final\Logo_OpticalMarketing\LOGOFINAL.png"/>
+          <p:cNvPicPr>
+            <a:picLocks noChangeAspect="1" noChangeArrowheads="1"/>
+          </p:cNvPicPr>
+          <p:nvPr/>
+        </p:nvPicPr>
+        <p:blipFill>
+          <a:blip r:embed="rId3" cstate="print"/>
+          <a:srcRect/>
+          <a:stretch>
+            <a:fillRect/>
+          </a:stretch>
+        </p:blipFill>
+        <p:spPr bwMode="auto">
+          <a:xfrm>
+            <a:off x="2643174" y="2714620"/>
+            <a:ext cx="4270836" cy="885826"/>
+          </a:xfrm>
+          <a:prstGeom prst="rect">
+            <a:avLst/>
+          </a:prstGeom>
+          <a:noFill/>
+        </p:spPr>
+      </p:pic>
+      <p:cxnSp>
+        <p:nvCxnSpPr>
+          <p:cNvPr id="9" name="8 Forma"/>
+          <p:cNvCxnSpPr>
+            <a:stCxn id="24581" idx="1"/>
+          </p:cNvCxnSpPr>
+          <p:nvPr/>
+        </p:nvCxnSpPr>
         <p:spPr>
-          <a:xfrm>
-            <a:off x="1571604" y="1214422"/>
-            <a:ext cx="4929222" cy="707886"/>
+          <a:xfrm rot="10800000" flipV="1">
+            <a:off x="1500166" y="3157532"/>
+            <a:ext cx="1143008" cy="1200161"/>
+          </a:xfrm>
+          <a:prstGeom prst="curvedConnector2">
+            <a:avLst/>
+          </a:prstGeom>
+          <a:ln w="41275">
+            <a:solidFill>
+              <a:srgbClr val="FF0000"/>
+            </a:solidFill>
+            <a:tailEnd type="arrow"/>
+          </a:ln>
+        </p:spPr>
+        <p:style>
+          <a:lnRef idx="1">
+            <a:schemeClr val="accent1"/>
+          </a:lnRef>
+          <a:fillRef idx="0">
+            <a:schemeClr val="accent1"/>
+          </a:fillRef>
+          <a:effectRef idx="0">
+            <a:schemeClr val="accent1"/>
+          </a:effectRef>
+          <a:fontRef idx="minor">
+            <a:schemeClr val="tx1"/>
+          </a:fontRef>
+        </p:style>
+      </p:cxnSp>
+      <p:cxnSp>
+        <p:nvCxnSpPr>
+          <p:cNvPr id="12" name="11 Forma"/>
+          <p:cNvCxnSpPr>
+            <a:stCxn id="24581" idx="3"/>
+          </p:cNvCxnSpPr>
+          <p:nvPr/>
+        </p:nvCxnSpPr>
+        <p:spPr>
+          <a:xfrm>
+            <a:off x="6914010" y="3157533"/>
+            <a:ext cx="848874" cy="1247813"/>
+          </a:xfrm>
+          <a:prstGeom prst="curvedConnector2">
+            <a:avLst/>
+          </a:prstGeom>
+          <a:ln w="41275">
+            <a:solidFill>
+              <a:srgbClr val="FF0000"/>
+            </a:solidFill>
+            <a:tailEnd type="arrow"/>
+          </a:ln>
+        </p:spPr>
+        <p:style>
+          <a:lnRef idx="1">
+            <a:schemeClr val="accent1"/>
+          </a:lnRef>
+          <a:fillRef idx="0">
+            <a:schemeClr val="accent1"/>
+          </a:fillRef>
+          <a:effectRef idx="0">
+            <a:schemeClr val="accent1"/>
+          </a:effectRef>
+          <a:fontRef idx="minor">
+            <a:schemeClr val="tx1"/>
+          </a:fontRef>
+        </p:style>
+      </p:cxnSp>
+      <p:cxnSp>
+        <p:nvCxnSpPr>
+          <p:cNvPr id="14" name="13 Conector recto de flecha"/>
+          <p:cNvCxnSpPr>
+            <a:stCxn id="24581" idx="0"/>
+          </p:cNvCxnSpPr>
+          <p:nvPr/>
+        </p:nvCxnSpPr>
+        <p:spPr>
+          <a:xfrm rot="16200000" flipV="1">
+            <a:off x="4346127" y="2282154"/>
+            <a:ext cx="836935" cy="27997"/>
+          </a:xfrm>
+          <a:prstGeom prst="straightConnector1">
+            <a:avLst/>
+          </a:prstGeom>
+          <a:ln w="41275">
+            <a:solidFill>
+              <a:srgbClr val="FF0000"/>
+            </a:solidFill>
+            <a:tailEnd type="arrow"/>
+          </a:ln>
+        </p:spPr>
+        <p:style>
+          <a:lnRef idx="1">
+            <a:schemeClr val="accent1"/>
+          </a:lnRef>
+          <a:fillRef idx="0">
+            <a:schemeClr val="accent1"/>
+          </a:fillRef>
+          <a:effectRef idx="0">
+            <a:schemeClr val="accent1"/>
+          </a:effectRef>
+          <a:fontRef idx="minor">
+            <a:schemeClr val="tx1"/>
+          </a:fontRef>
+        </p:style>
+      </p:cxnSp>
+      <p:pic>
+        <p:nvPicPr>
+          <p:cNvPr id="10" name="Picture 2" descr="http://www.portlandpowersearch.com/wp-content/uploads/2010/12/images-1.jpg"/>
+          <p:cNvPicPr>
+            <a:picLocks noChangeAspect="1" noChangeArrowheads="1"/>
+          </p:cNvPicPr>
+          <p:nvPr/>
+        </p:nvPicPr>
+        <p:blipFill>
+          <a:blip r:embed="rId4"/>
+          <a:srcRect/>
+          <a:stretch>
+            <a:fillRect/>
+          </a:stretch>
+        </p:blipFill>
+        <p:spPr bwMode="auto">
+          <a:xfrm>
+            <a:off x="0" y="4429132"/>
+            <a:ext cx="2571750" cy="1771651"/>
           </a:xfrm>
           <a:prstGeom prst="rect">
             <a:avLst/>
           </a:prstGeom>
-        </p:spPr>
-        <p:txBody>
-          <a:bodyPr wrap="square">
-            <a:spAutoFit/>
-          </a:bodyPr>
-          <a:lstStyle/>
-          <a:p>
-            <a:pPr>
-              <a:buFont typeface="Arial" pitchFamily="34" charset="0"/>
-              <a:buChar char="•"/>
-            </a:pPr>
-            <a:r>
-              <a:rPr lang="es-AR" sz="4000" dirty="0" smtClean="0">
-                <a:latin typeface="Verdana" pitchFamily="34" charset="0"/>
-                <a:ea typeface="Verdana" pitchFamily="34" charset="0"/>
-                <a:cs typeface="Verdana" pitchFamily="34" charset="0"/>
-              </a:rPr>
-              <a:t>PONER NUMEROS</a:t>
-            </a:r>
-          </a:p>
-        </p:txBody>
-      </p:sp>
+          <a:noFill/>
+        </p:spPr>
+      </p:pic>
+      <p:pic>
+        <p:nvPicPr>
+          <p:cNvPr id="11" name="Picture 4" descr="http://cf.scdn.co/i/wp/get-spotify/getspotify_product_thumb_unlimited.png"/>
+          <p:cNvPicPr>
+            <a:picLocks noChangeAspect="1" noChangeArrowheads="1"/>
+          </p:cNvPicPr>
+          <p:nvPr/>
+        </p:nvPicPr>
+        <p:blipFill>
+          <a:blip r:embed="rId5"/>
+          <a:srcRect/>
+          <a:stretch>
+            <a:fillRect/>
+          </a:stretch>
+        </p:blipFill>
+        <p:spPr bwMode="auto">
+          <a:xfrm>
+            <a:off x="6000760" y="4572008"/>
+            <a:ext cx="2971800" cy="1676400"/>
+          </a:xfrm>
+          <a:prstGeom prst="rect">
+            <a:avLst/>
+          </a:prstGeom>
+          <a:noFill/>
+        </p:spPr>
+      </p:pic>
+      <p:pic>
+        <p:nvPicPr>
+          <p:cNvPr id="13" name="Picture 6" descr="http://blogs.earthlink.net/wp-content/uploads/2012/02/customer-service.jpg"/>
+          <p:cNvPicPr>
+            <a:picLocks noChangeAspect="1" noChangeArrowheads="1"/>
+          </p:cNvPicPr>
+          <p:nvPr/>
+        </p:nvPicPr>
+        <p:blipFill>
+          <a:blip r:embed="rId6" cstate="print"/>
+          <a:srcRect/>
+          <a:stretch>
+            <a:fillRect/>
+          </a:stretch>
+        </p:blipFill>
+        <p:spPr bwMode="auto">
+          <a:xfrm>
+            <a:off x="3714744" y="285728"/>
+            <a:ext cx="2071702" cy="1471866"/>
+          </a:xfrm>
+          <a:prstGeom prst="rect">
+            <a:avLst/>
+          </a:prstGeom>
+          <a:noFill/>
+        </p:spPr>
+      </p:pic>
     </p:spTree>
   </p:cSld>
   <p:clrMapOvr>
@@ -6008,190 +6377,9 @@
           <a:chExt cx="0" cy="0"/>
         </a:xfrm>
       </p:grpSpPr>
-      <p:sp>
-        <p:nvSpPr>
-          <p:cNvPr id="5" name="4 Rectángulo"/>
-          <p:cNvSpPr/>
-          <p:nvPr/>
-        </p:nvSpPr>
-        <p:spPr>
-          <a:xfrm>
-            <a:off x="1142976" y="1500174"/>
-            <a:ext cx="7572396" cy="4524315"/>
-          </a:xfrm>
-          <a:prstGeom prst="rect">
-            <a:avLst/>
-          </a:prstGeom>
-        </p:spPr>
-        <p:txBody>
-          <a:bodyPr wrap="square">
-            <a:spAutoFit/>
-          </a:bodyPr>
-          <a:lstStyle/>
-          <a:p>
-            <a:pPr>
-              <a:buFont typeface="Arial" pitchFamily="34" charset="0"/>
-              <a:buChar char="•"/>
-            </a:pPr>
-            <a:r>
-              <a:rPr lang="es-AR" sz="3200" dirty="0" smtClean="0">
-                <a:latin typeface="Verdana" pitchFamily="34" charset="0"/>
-                <a:ea typeface="Verdana" pitchFamily="34" charset="0"/>
-                <a:cs typeface="Verdana" pitchFamily="34" charset="0"/>
-              </a:rPr>
-              <a:t>Captura.</a:t>
-            </a:r>
-          </a:p>
-          <a:p>
-            <a:pPr>
-              <a:buFont typeface="Arial" pitchFamily="34" charset="0"/>
-              <a:buChar char="•"/>
-            </a:pPr>
-            <a:endParaRPr lang="es-AR" sz="3200" dirty="0" smtClean="0">
-              <a:latin typeface="Verdana" pitchFamily="34" charset="0"/>
-              <a:ea typeface="Verdana" pitchFamily="34" charset="0"/>
-              <a:cs typeface="Verdana" pitchFamily="34" charset="0"/>
-            </a:endParaRPr>
-          </a:p>
-          <a:p>
-            <a:pPr>
-              <a:buFont typeface="Arial" pitchFamily="34" charset="0"/>
-              <a:buChar char="•"/>
-            </a:pPr>
-            <a:r>
-              <a:rPr lang="es-AR" sz="3200" dirty="0" err="1" smtClean="0">
-                <a:latin typeface="Verdana" pitchFamily="34" charset="0"/>
-                <a:ea typeface="Verdana" pitchFamily="34" charset="0"/>
-                <a:cs typeface="Verdana" pitchFamily="34" charset="0"/>
-              </a:rPr>
-              <a:t>Preprocesamiento</a:t>
-            </a:r>
-            <a:r>
-              <a:rPr lang="es-AR" sz="3200" dirty="0" smtClean="0">
-                <a:latin typeface="Verdana" pitchFamily="34" charset="0"/>
-                <a:ea typeface="Verdana" pitchFamily="34" charset="0"/>
-                <a:cs typeface="Verdana" pitchFamily="34" charset="0"/>
-              </a:rPr>
-              <a:t>.</a:t>
-            </a:r>
-          </a:p>
-          <a:p>
-            <a:pPr>
-              <a:buFont typeface="Arial" pitchFamily="34" charset="0"/>
-              <a:buChar char="•"/>
-            </a:pPr>
-            <a:endParaRPr lang="es-AR" sz="3200" dirty="0" smtClean="0">
-              <a:latin typeface="Verdana" pitchFamily="34" charset="0"/>
-              <a:ea typeface="Verdana" pitchFamily="34" charset="0"/>
-              <a:cs typeface="Verdana" pitchFamily="34" charset="0"/>
-            </a:endParaRPr>
-          </a:p>
-          <a:p>
-            <a:pPr>
-              <a:buFont typeface="Arial" pitchFamily="34" charset="0"/>
-              <a:buChar char="•"/>
-            </a:pPr>
-            <a:r>
-              <a:rPr lang="es-AR" sz="3200" dirty="0" smtClean="0">
-                <a:latin typeface="Verdana" pitchFamily="34" charset="0"/>
-                <a:ea typeface="Verdana" pitchFamily="34" charset="0"/>
-                <a:cs typeface="Verdana" pitchFamily="34" charset="0"/>
-              </a:rPr>
-              <a:t>Segmentación y representación.</a:t>
-            </a:r>
-          </a:p>
-          <a:p>
-            <a:pPr>
-              <a:buFont typeface="Arial" pitchFamily="34" charset="0"/>
-              <a:buChar char="•"/>
-            </a:pPr>
-            <a:endParaRPr lang="es-AR" sz="3200" dirty="0" smtClean="0">
-              <a:latin typeface="Verdana" pitchFamily="34" charset="0"/>
-              <a:ea typeface="Verdana" pitchFamily="34" charset="0"/>
-              <a:cs typeface="Verdana" pitchFamily="34" charset="0"/>
-            </a:endParaRPr>
-          </a:p>
-          <a:p>
-            <a:pPr>
-              <a:buFont typeface="Arial" pitchFamily="34" charset="0"/>
-              <a:buChar char="•"/>
-            </a:pPr>
-            <a:r>
-              <a:rPr lang="es-AR" sz="3200" dirty="0" smtClean="0">
-                <a:latin typeface="Verdana" pitchFamily="34" charset="0"/>
-                <a:ea typeface="Verdana" pitchFamily="34" charset="0"/>
-                <a:cs typeface="Verdana" pitchFamily="34" charset="0"/>
-              </a:rPr>
-              <a:t>Interacción.</a:t>
-            </a:r>
-          </a:p>
-          <a:p>
-            <a:pPr>
-              <a:buFont typeface="Arial" pitchFamily="34" charset="0"/>
-              <a:buChar char="•"/>
-            </a:pPr>
-            <a:endParaRPr lang="es-AR" sz="3200" dirty="0" smtClean="0">
-              <a:latin typeface="Verdana" pitchFamily="34" charset="0"/>
-              <a:ea typeface="Verdana" pitchFamily="34" charset="0"/>
-              <a:cs typeface="Verdana" pitchFamily="34" charset="0"/>
-            </a:endParaRPr>
-          </a:p>
-          <a:p>
-            <a:pPr>
-              <a:buFont typeface="Arial" pitchFamily="34" charset="0"/>
-              <a:buChar char="•"/>
-            </a:pPr>
-            <a:r>
-              <a:rPr lang="es-AR" sz="3200" dirty="0" smtClean="0">
-                <a:latin typeface="Verdana" pitchFamily="34" charset="0"/>
-                <a:ea typeface="Verdana" pitchFamily="34" charset="0"/>
-                <a:cs typeface="Verdana" pitchFamily="34" charset="0"/>
-              </a:rPr>
-              <a:t>Web.</a:t>
-            </a:r>
-          </a:p>
-        </p:txBody>
-      </p:sp>
-      <p:sp>
-        <p:nvSpPr>
-          <p:cNvPr id="6" name="5 Rectángulo"/>
-          <p:cNvSpPr/>
-          <p:nvPr/>
-        </p:nvSpPr>
-        <p:spPr>
-          <a:xfrm>
-            <a:off x="2143108" y="571480"/>
-            <a:ext cx="5786478" cy="707886"/>
-          </a:xfrm>
-          <a:prstGeom prst="rect">
-            <a:avLst/>
-          </a:prstGeom>
-        </p:spPr>
-        <p:txBody>
-          <a:bodyPr wrap="square">
-            <a:spAutoFit/>
-          </a:bodyPr>
-          <a:lstStyle/>
-          <a:p>
-            <a:r>
-              <a:rPr lang="es-AR" sz="4000" dirty="0" smtClean="0">
-                <a:latin typeface="Verdana" pitchFamily="34" charset="0"/>
-                <a:ea typeface="Verdana" pitchFamily="34" charset="0"/>
-                <a:cs typeface="Verdana" pitchFamily="34" charset="0"/>
-              </a:rPr>
-              <a:t>Módulos integrados</a:t>
-            </a:r>
-            <a:endParaRPr lang="es-AR" sz="4000" dirty="0" smtClean="0">
-              <a:latin typeface="Verdana" pitchFamily="34" charset="0"/>
-              <a:ea typeface="Verdana" pitchFamily="34" charset="0"/>
-              <a:cs typeface="Verdana" pitchFamily="34" charset="0"/>
-            </a:endParaRPr>
-          </a:p>
-        </p:txBody>
-      </p:sp>
       <p:pic>
         <p:nvPicPr>
-          <p:cNvPr id="7" name="Picture 2" descr="D:\ProyectoFinal\Proyecto final\Logo_OpticalMarketing\iso2.png"/>
+          <p:cNvPr id="24581" name="Picture 5" descr="D:\ProyectoFinal\Proyecto final\Logo_OpticalMarketing\LOGOFINAL.png"/>
           <p:cNvPicPr>
             <a:picLocks noChangeAspect="1" noChangeArrowheads="1"/>
           </p:cNvPicPr>
@@ -6206,8 +6394,8 @@
         </p:blipFill>
         <p:spPr bwMode="auto">
           <a:xfrm>
-            <a:off x="1071538" y="142852"/>
-            <a:ext cx="1071569" cy="1096743"/>
+            <a:off x="2643174" y="2714620"/>
+            <a:ext cx="4270836" cy="885826"/>
           </a:xfrm>
           <a:prstGeom prst="rect">
             <a:avLst/>
@@ -6215,25 +6403,139 @@
           <a:noFill/>
         </p:spPr>
       </p:pic>
+      <p:cxnSp>
+        <p:nvCxnSpPr>
+          <p:cNvPr id="9" name="8 Forma"/>
+          <p:cNvCxnSpPr>
+            <a:stCxn id="24581" idx="1"/>
+          </p:cNvCxnSpPr>
+          <p:nvPr/>
+        </p:nvCxnSpPr>
+        <p:spPr>
+          <a:xfrm rot="10800000" flipV="1">
+            <a:off x="1500166" y="3157532"/>
+            <a:ext cx="1143008" cy="1200161"/>
+          </a:xfrm>
+          <a:prstGeom prst="curvedConnector2">
+            <a:avLst/>
+          </a:prstGeom>
+          <a:ln w="41275">
+            <a:solidFill>
+              <a:srgbClr val="FF0000"/>
+            </a:solidFill>
+            <a:tailEnd type="arrow"/>
+          </a:ln>
+        </p:spPr>
+        <p:style>
+          <a:lnRef idx="1">
+            <a:schemeClr val="accent1"/>
+          </a:lnRef>
+          <a:fillRef idx="0">
+            <a:schemeClr val="accent1"/>
+          </a:fillRef>
+          <a:effectRef idx="0">
+            <a:schemeClr val="accent1"/>
+          </a:effectRef>
+          <a:fontRef idx="minor">
+            <a:schemeClr val="tx1"/>
+          </a:fontRef>
+        </p:style>
+      </p:cxnSp>
+      <p:cxnSp>
+        <p:nvCxnSpPr>
+          <p:cNvPr id="12" name="11 Forma"/>
+          <p:cNvCxnSpPr>
+            <a:stCxn id="24581" idx="3"/>
+          </p:cNvCxnSpPr>
+          <p:nvPr/>
+        </p:nvCxnSpPr>
+        <p:spPr>
+          <a:xfrm>
+            <a:off x="6914010" y="3157533"/>
+            <a:ext cx="848874" cy="1247813"/>
+          </a:xfrm>
+          <a:prstGeom prst="curvedConnector2">
+            <a:avLst/>
+          </a:prstGeom>
+          <a:ln w="41275">
+            <a:solidFill>
+              <a:srgbClr val="FF0000"/>
+            </a:solidFill>
+            <a:tailEnd type="arrow"/>
+          </a:ln>
+        </p:spPr>
+        <p:style>
+          <a:lnRef idx="1">
+            <a:schemeClr val="accent1"/>
+          </a:lnRef>
+          <a:fillRef idx="0">
+            <a:schemeClr val="accent1"/>
+          </a:fillRef>
+          <a:effectRef idx="0">
+            <a:schemeClr val="accent1"/>
+          </a:effectRef>
+          <a:fontRef idx="minor">
+            <a:schemeClr val="tx1"/>
+          </a:fontRef>
+        </p:style>
+      </p:cxnSp>
+      <p:cxnSp>
+        <p:nvCxnSpPr>
+          <p:cNvPr id="14" name="13 Conector recto de flecha"/>
+          <p:cNvCxnSpPr>
+            <a:stCxn id="24581" idx="0"/>
+          </p:cNvCxnSpPr>
+          <p:nvPr/>
+        </p:nvCxnSpPr>
+        <p:spPr>
+          <a:xfrm rot="16200000" flipV="1">
+            <a:off x="4346127" y="2282154"/>
+            <a:ext cx="836935" cy="27997"/>
+          </a:xfrm>
+          <a:prstGeom prst="straightConnector1">
+            <a:avLst/>
+          </a:prstGeom>
+          <a:ln w="41275">
+            <a:solidFill>
+              <a:srgbClr val="FF0000"/>
+            </a:solidFill>
+            <a:tailEnd type="arrow"/>
+          </a:ln>
+        </p:spPr>
+        <p:style>
+          <a:lnRef idx="1">
+            <a:schemeClr val="accent1"/>
+          </a:lnRef>
+          <a:fillRef idx="0">
+            <a:schemeClr val="accent1"/>
+          </a:fillRef>
+          <a:effectRef idx="0">
+            <a:schemeClr val="accent1"/>
+          </a:effectRef>
+          <a:fontRef idx="minor">
+            <a:schemeClr val="tx1"/>
+          </a:fontRef>
+        </p:style>
+      </p:cxnSp>
       <p:pic>
         <p:nvPicPr>
-          <p:cNvPr id="8" name="Picture 2" descr="D:\ProyectoFinal\Proyecto final\Logo_OpticalMarketing\iso2.png"/>
+          <p:cNvPr id="55298" name="Picture 2" descr="http://www.turn.com/sites/default/files/wp-content/uploads/2011/02/retargeting_max_article-499x405.jpg"/>
           <p:cNvPicPr>
             <a:picLocks noChangeAspect="1" noChangeArrowheads="1"/>
           </p:cNvPicPr>
           <p:nvPr/>
         </p:nvPicPr>
         <p:blipFill>
-          <a:blip r:embed="rId3" cstate="print"/>
+          <a:blip r:embed="rId4"/>
           <a:srcRect/>
           <a:stretch>
             <a:fillRect/>
           </a:stretch>
         </p:blipFill>
         <p:spPr bwMode="auto">
-          <a:xfrm flipH="1">
-            <a:off x="7286644" y="142852"/>
-            <a:ext cx="1071539" cy="1096743"/>
+          <a:xfrm>
+            <a:off x="3497961" y="-24"/>
+            <a:ext cx="2288485" cy="1857388"/>
           </a:xfrm>
           <a:prstGeom prst="rect">
             <a:avLst/>
@@ -6275,22 +6577,21 @@
       </p:grpSpPr>
       <p:sp>
         <p:nvSpPr>
-          <p:cNvPr id="7" name="6 CuadroTexto"/>
-          <p:cNvSpPr txBox="1"/>
+          <p:cNvPr id="5" name="4 Rectángulo"/>
+          <p:cNvSpPr/>
           <p:nvPr/>
         </p:nvSpPr>
         <p:spPr>
           <a:xfrm>
-            <a:off x="5643570" y="1785926"/>
-            <a:ext cx="3357586" cy="2677656"/>
+            <a:off x="1142976" y="1500174"/>
+            <a:ext cx="7572396" cy="4524315"/>
           </a:xfrm>
           <a:prstGeom prst="rect">
             <a:avLst/>
           </a:prstGeom>
-          <a:noFill/>
-        </p:spPr>
-        <p:txBody>
-          <a:bodyPr wrap="square" rtlCol="0">
+        </p:spPr>
+        <p:txBody>
+          <a:bodyPr wrap="square">
             <a:spAutoFit/>
           </a:bodyPr>
           <a:lstStyle/>
@@ -6300,57 +6601,133 @@
               <a:buChar char="•"/>
             </a:pPr>
             <a:r>
-              <a:rPr lang="es-AR" sz="2800" dirty="0" smtClean="0"/>
-              <a:t>Capturar imágenes</a:t>
-            </a:r>
-          </a:p>
-          <a:p>
-            <a:r>
-              <a:rPr lang="es-AR" sz="2800" dirty="0" smtClean="0"/>
-              <a:t>a procesar.</a:t>
-            </a:r>
-          </a:p>
-          <a:p>
-            <a:endParaRPr lang="es-AR" sz="2800" dirty="0" smtClean="0"/>
+              <a:rPr lang="es-AR" sz="3200" dirty="0" smtClean="0">
+                <a:latin typeface="Verdana" pitchFamily="34" charset="0"/>
+                <a:ea typeface="Verdana" pitchFamily="34" charset="0"/>
+                <a:cs typeface="Verdana" pitchFamily="34" charset="0"/>
+              </a:rPr>
+              <a:t>Captura.</a:t>
+            </a:r>
           </a:p>
           <a:p>
             <a:pPr>
               <a:buFont typeface="Arial" pitchFamily="34" charset="0"/>
               <a:buChar char="•"/>
             </a:pPr>
-            <a:r>
-              <a:rPr lang="es-AR" sz="2800" dirty="0" smtClean="0"/>
-              <a:t>Asignar formatos</a:t>
-            </a:r>
-            <a:br>
-              <a:rPr lang="es-AR" sz="2800" dirty="0" smtClean="0"/>
-            </a:br>
-            <a:r>
-              <a:rPr lang="es-AR" sz="2800" dirty="0" smtClean="0"/>
-              <a:t> y estilos a imágenes</a:t>
-            </a:r>
-          </a:p>
-          <a:p>
-            <a:r>
-              <a:rPr lang="es-AR" sz="2800" dirty="0" smtClean="0"/>
-              <a:t>c</a:t>
-            </a:r>
-            <a:r>
-              <a:rPr lang="es-AR" sz="2800" dirty="0" smtClean="0"/>
-              <a:t>apturadas.</a:t>
-            </a:r>
-          </a:p>
-        </p:txBody>
-      </p:sp>
-      <p:sp>
-        <p:nvSpPr>
-          <p:cNvPr id="9" name="8 Rectángulo"/>
+            <a:endParaRPr lang="es-AR" sz="3200" dirty="0" smtClean="0">
+              <a:latin typeface="Verdana" pitchFamily="34" charset="0"/>
+              <a:ea typeface="Verdana" pitchFamily="34" charset="0"/>
+              <a:cs typeface="Verdana" pitchFamily="34" charset="0"/>
+            </a:endParaRPr>
+          </a:p>
+          <a:p>
+            <a:pPr>
+              <a:buFont typeface="Arial" pitchFamily="34" charset="0"/>
+              <a:buChar char="•"/>
+            </a:pPr>
+            <a:r>
+              <a:rPr lang="es-AR" sz="3200" dirty="0" err="1" smtClean="0">
+                <a:latin typeface="Verdana" pitchFamily="34" charset="0"/>
+                <a:ea typeface="Verdana" pitchFamily="34" charset="0"/>
+                <a:cs typeface="Verdana" pitchFamily="34" charset="0"/>
+              </a:rPr>
+              <a:t>Preprocesamiento</a:t>
+            </a:r>
+            <a:r>
+              <a:rPr lang="es-AR" sz="3200" dirty="0" smtClean="0">
+                <a:latin typeface="Verdana" pitchFamily="34" charset="0"/>
+                <a:ea typeface="Verdana" pitchFamily="34" charset="0"/>
+                <a:cs typeface="Verdana" pitchFamily="34" charset="0"/>
+              </a:rPr>
+              <a:t>.</a:t>
+            </a:r>
+          </a:p>
+          <a:p>
+            <a:pPr>
+              <a:buFont typeface="Arial" pitchFamily="34" charset="0"/>
+              <a:buChar char="•"/>
+            </a:pPr>
+            <a:endParaRPr lang="es-AR" sz="3200" dirty="0" smtClean="0">
+              <a:latin typeface="Verdana" pitchFamily="34" charset="0"/>
+              <a:ea typeface="Verdana" pitchFamily="34" charset="0"/>
+              <a:cs typeface="Verdana" pitchFamily="34" charset="0"/>
+            </a:endParaRPr>
+          </a:p>
+          <a:p>
+            <a:pPr>
+              <a:buFont typeface="Arial" pitchFamily="34" charset="0"/>
+              <a:buChar char="•"/>
+            </a:pPr>
+            <a:r>
+              <a:rPr lang="es-AR" sz="3200" dirty="0" smtClean="0">
+                <a:latin typeface="Verdana" pitchFamily="34" charset="0"/>
+                <a:ea typeface="Verdana" pitchFamily="34" charset="0"/>
+                <a:cs typeface="Verdana" pitchFamily="34" charset="0"/>
+              </a:rPr>
+              <a:t>Segmentación y representación.</a:t>
+            </a:r>
+          </a:p>
+          <a:p>
+            <a:pPr>
+              <a:buFont typeface="Arial" pitchFamily="34" charset="0"/>
+              <a:buChar char="•"/>
+            </a:pPr>
+            <a:endParaRPr lang="es-AR" sz="3200" dirty="0" smtClean="0">
+              <a:latin typeface="Verdana" pitchFamily="34" charset="0"/>
+              <a:ea typeface="Verdana" pitchFamily="34" charset="0"/>
+              <a:cs typeface="Verdana" pitchFamily="34" charset="0"/>
+            </a:endParaRPr>
+          </a:p>
+          <a:p>
+            <a:pPr>
+              <a:buFont typeface="Arial" pitchFamily="34" charset="0"/>
+              <a:buChar char="•"/>
+            </a:pPr>
+            <a:r>
+              <a:rPr lang="es-AR" sz="3200" dirty="0" smtClean="0">
+                <a:latin typeface="Verdana" pitchFamily="34" charset="0"/>
+                <a:ea typeface="Verdana" pitchFamily="34" charset="0"/>
+                <a:cs typeface="Verdana" pitchFamily="34" charset="0"/>
+              </a:rPr>
+              <a:t>Interacción.</a:t>
+            </a:r>
+          </a:p>
+          <a:p>
+            <a:pPr>
+              <a:buFont typeface="Arial" pitchFamily="34" charset="0"/>
+              <a:buChar char="•"/>
+            </a:pPr>
+            <a:endParaRPr lang="es-AR" sz="3200" dirty="0" smtClean="0">
+              <a:latin typeface="Verdana" pitchFamily="34" charset="0"/>
+              <a:ea typeface="Verdana" pitchFamily="34" charset="0"/>
+              <a:cs typeface="Verdana" pitchFamily="34" charset="0"/>
+            </a:endParaRPr>
+          </a:p>
+          <a:p>
+            <a:pPr>
+              <a:buFont typeface="Arial" pitchFamily="34" charset="0"/>
+              <a:buChar char="•"/>
+            </a:pPr>
+            <a:r>
+              <a:rPr lang="es-AR" sz="3200" dirty="0" smtClean="0">
+                <a:latin typeface="Verdana" pitchFamily="34" charset="0"/>
+                <a:ea typeface="Verdana" pitchFamily="34" charset="0"/>
+                <a:cs typeface="Verdana" pitchFamily="34" charset="0"/>
+              </a:rPr>
+              <a:t>Web.</a:t>
+            </a:r>
+          </a:p>
+        </p:txBody>
+      </p:sp>
+      <p:sp>
+        <p:nvSpPr>
+          <p:cNvPr id="6" name="5 Rectángulo"/>
           <p:cNvSpPr/>
           <p:nvPr/>
         </p:nvSpPr>
         <p:spPr>
           <a:xfrm>
-            <a:off x="2143108" y="500042"/>
+            <a:off x="2143108" y="571480"/>
             <a:ext cx="5786478" cy="707886"/>
           </a:xfrm>
           <a:prstGeom prst="rect">
@@ -6369,19 +6746,14 @@
                 <a:ea typeface="Verdana" pitchFamily="34" charset="0"/>
                 <a:cs typeface="Verdana" pitchFamily="34" charset="0"/>
               </a:rPr>
-              <a:t>Captura</a:t>
-            </a:r>
-            <a:endParaRPr lang="es-AR" sz="4000" dirty="0" smtClean="0">
-              <a:latin typeface="Verdana" pitchFamily="34" charset="0"/>
-              <a:ea typeface="Verdana" pitchFamily="34" charset="0"/>
-              <a:cs typeface="Verdana" pitchFamily="34" charset="0"/>
-            </a:endParaRPr>
+              <a:t>Módulos integrados</a:t>
+            </a:r>
           </a:p>
         </p:txBody>
       </p:sp>
       <p:pic>
         <p:nvPicPr>
-          <p:cNvPr id="5" name="Picture 2" descr="D:\ProyectoFinal\Proyecto final\Logo_OpticalMarketing\iso2.png"/>
+          <p:cNvPr id="7" name="Picture 2" descr="D:\ProyectoFinal\Proyecto final\Logo_OpticalMarketing\iso2.png"/>
           <p:cNvPicPr>
             <a:picLocks noChangeAspect="1" noChangeArrowheads="1"/>
           </p:cNvPicPr>
@@ -6407,23 +6779,23 @@
       </p:pic>
       <p:pic>
         <p:nvPicPr>
-          <p:cNvPr id="4098" name="Picture 2" descr="http://eandt.theiet.org/news/2011/jun/images/640_motion-capture_web.jpg"/>
+          <p:cNvPr id="8" name="Picture 2" descr="D:\ProyectoFinal\Proyecto final\Logo_OpticalMarketing\iso2.png"/>
           <p:cNvPicPr>
             <a:picLocks noChangeAspect="1" noChangeArrowheads="1"/>
           </p:cNvPicPr>
           <p:nvPr/>
         </p:nvPicPr>
         <p:blipFill>
-          <a:blip r:embed="rId4"/>
+          <a:blip r:embed="rId3" cstate="print"/>
           <a:srcRect/>
           <a:stretch>
             <a:fillRect/>
           </a:stretch>
         </p:blipFill>
         <p:spPr bwMode="auto">
-          <a:xfrm>
-            <a:off x="285720" y="1785926"/>
-            <a:ext cx="5258910" cy="3500462"/>
+          <a:xfrm flipH="1">
+            <a:off x="7286644" y="142852"/>
+            <a:ext cx="1071539" cy="1096743"/>
           </a:xfrm>
           <a:prstGeom prst="rect">
             <a:avLst/>
@@ -6463,16 +6835,113 @@
           <a:chExt cx="0" cy="0"/>
         </a:xfrm>
       </p:grpSpPr>
+      <p:sp>
+        <p:nvSpPr>
+          <p:cNvPr id="7" name="6 CuadroTexto"/>
+          <p:cNvSpPr txBox="1"/>
+          <p:nvPr/>
+        </p:nvSpPr>
+        <p:spPr>
+          <a:xfrm>
+            <a:off x="5643570" y="1785926"/>
+            <a:ext cx="3357586" cy="2677656"/>
+          </a:xfrm>
+          <a:prstGeom prst="rect">
+            <a:avLst/>
+          </a:prstGeom>
+          <a:noFill/>
+        </p:spPr>
+        <p:txBody>
+          <a:bodyPr wrap="square" rtlCol="0">
+            <a:spAutoFit/>
+          </a:bodyPr>
+          <a:lstStyle/>
+          <a:p>
+            <a:pPr>
+              <a:buFont typeface="Arial" pitchFamily="34" charset="0"/>
+              <a:buChar char="•"/>
+            </a:pPr>
+            <a:r>
+              <a:rPr lang="es-AR" sz="2800" dirty="0" smtClean="0"/>
+              <a:t>Capturar imágenes</a:t>
+            </a:r>
+          </a:p>
+          <a:p>
+            <a:r>
+              <a:rPr lang="es-AR" sz="2800" dirty="0" smtClean="0"/>
+              <a:t>a procesar.</a:t>
+            </a:r>
+          </a:p>
+          <a:p>
+            <a:endParaRPr lang="es-AR" sz="2800" dirty="0" smtClean="0"/>
+          </a:p>
+          <a:p>
+            <a:pPr>
+              <a:buFont typeface="Arial" pitchFamily="34" charset="0"/>
+              <a:buChar char="•"/>
+            </a:pPr>
+            <a:r>
+              <a:rPr lang="es-AR" sz="2800" dirty="0" smtClean="0"/>
+              <a:t>Asignar formatos</a:t>
+            </a:r>
+            <a:br>
+              <a:rPr lang="es-AR" sz="2800" dirty="0" smtClean="0"/>
+            </a:br>
+            <a:r>
+              <a:rPr lang="es-AR" sz="2800" dirty="0" smtClean="0"/>
+              <a:t> y estilos a imágenes</a:t>
+            </a:r>
+          </a:p>
+          <a:p>
+            <a:r>
+              <a:rPr lang="es-AR" sz="2800" dirty="0" smtClean="0"/>
+              <a:t>capturadas.</a:t>
+            </a:r>
+          </a:p>
+        </p:txBody>
+      </p:sp>
+      <p:sp>
+        <p:nvSpPr>
+          <p:cNvPr id="9" name="8 Rectángulo"/>
+          <p:cNvSpPr/>
+          <p:nvPr/>
+        </p:nvSpPr>
+        <p:spPr>
+          <a:xfrm>
+            <a:off x="2143108" y="500042"/>
+            <a:ext cx="5786478" cy="707886"/>
+          </a:xfrm>
+          <a:prstGeom prst="rect">
+            <a:avLst/>
+          </a:prstGeom>
+        </p:spPr>
+        <p:txBody>
+          <a:bodyPr wrap="square">
+            <a:spAutoFit/>
+          </a:bodyPr>
+          <a:lstStyle/>
+          <a:p>
+            <a:r>
+              <a:rPr lang="es-AR" sz="4000" dirty="0" smtClean="0">
+                <a:latin typeface="Verdana" pitchFamily="34" charset="0"/>
+                <a:ea typeface="Verdana" pitchFamily="34" charset="0"/>
+                <a:cs typeface="Verdana" pitchFamily="34" charset="0"/>
+              </a:rPr>
+              <a:t>Captura</a:t>
+            </a:r>
+          </a:p>
+        </p:txBody>
+      </p:sp>
       <p:pic>
         <p:nvPicPr>
-          <p:cNvPr id="2050" name="Picture 2"/>
+          <p:cNvPr id="5" name="Picture 2" descr="D:\ProyectoFinal\Proyecto final\Logo_OpticalMarketing\iso2.png"/>
           <p:cNvPicPr>
             <a:picLocks noChangeAspect="1" noChangeArrowheads="1"/>
           </p:cNvPicPr>
           <p:nvPr/>
         </p:nvPicPr>
         <p:blipFill>
-          <a:blip r:embed="rId3"/>
+          <a:blip r:embed="rId3" cstate="print"/>
           <a:srcRect/>
           <a:stretch>
             <a:fillRect/>
@@ -6480,133 +6949,25 @@
         </p:blipFill>
         <p:spPr bwMode="auto">
           <a:xfrm>
-            <a:off x="214282" y="2000240"/>
-            <a:ext cx="4730638" cy="3071834"/>
+            <a:off x="1071538" y="142852"/>
+            <a:ext cx="1071569" cy="1096743"/>
           </a:xfrm>
           <a:prstGeom prst="rect">
             <a:avLst/>
           </a:prstGeom>
           <a:noFill/>
-          <a:ln w="9525">
-            <a:noFill/>
-            <a:miter lim="800000"/>
-            <a:headEnd/>
-            <a:tailEnd/>
-          </a:ln>
-          <a:effectLst/>
         </p:spPr>
       </p:pic>
-      <p:sp>
-        <p:nvSpPr>
-          <p:cNvPr id="7" name="6 CuadroTexto"/>
-          <p:cNvSpPr txBox="1"/>
-          <p:nvPr/>
-        </p:nvSpPr>
-        <p:spPr>
-          <a:xfrm>
-            <a:off x="5000628" y="1928802"/>
-            <a:ext cx="3929090" cy="3970318"/>
-          </a:xfrm>
-          <a:prstGeom prst="rect">
-            <a:avLst/>
-          </a:prstGeom>
-          <a:noFill/>
-        </p:spPr>
-        <p:txBody>
-          <a:bodyPr wrap="square" rtlCol="0">
-            <a:spAutoFit/>
-          </a:bodyPr>
-          <a:lstStyle/>
-          <a:p>
-            <a:pPr>
-              <a:buFont typeface="Arial" pitchFamily="34" charset="0"/>
-              <a:buChar char="•"/>
-            </a:pPr>
-            <a:r>
-              <a:rPr lang="es-AR" sz="2800" dirty="0" smtClean="0"/>
-              <a:t>Realizar filtrado sobre las imágenes para reconocer la figura humana.</a:t>
-            </a:r>
-          </a:p>
-          <a:p>
-            <a:endParaRPr lang="es-AR" sz="2800" dirty="0" smtClean="0"/>
-          </a:p>
-          <a:p>
-            <a:pPr>
-              <a:buFont typeface="Arial" pitchFamily="34" charset="0"/>
-              <a:buChar char="•"/>
-            </a:pPr>
-            <a:r>
-              <a:rPr lang="es-AR" sz="2800" dirty="0" smtClean="0"/>
-              <a:t>Identificar inicialmente objetos.</a:t>
-            </a:r>
-          </a:p>
-          <a:p>
-            <a:pPr>
-              <a:buFont typeface="Arial" pitchFamily="34" charset="0"/>
-              <a:buChar char="•"/>
-            </a:pPr>
-            <a:endParaRPr lang="es-AR" sz="2800" dirty="0" smtClean="0"/>
-          </a:p>
-          <a:p>
-            <a:pPr>
-              <a:buFont typeface="Arial" pitchFamily="34" charset="0"/>
-              <a:buChar char="•"/>
-            </a:pPr>
-            <a:r>
-              <a:rPr lang="es-AR" sz="2800" dirty="0" smtClean="0"/>
-              <a:t>Procesamiento de matrices de captura.</a:t>
-            </a:r>
-            <a:endParaRPr lang="es-AR" sz="2800" dirty="0"/>
-          </a:p>
-        </p:txBody>
-      </p:sp>
-      <p:sp>
-        <p:nvSpPr>
-          <p:cNvPr id="9" name="8 Rectángulo"/>
-          <p:cNvSpPr/>
-          <p:nvPr/>
-        </p:nvSpPr>
-        <p:spPr>
-          <a:xfrm>
-            <a:off x="2143108" y="571480"/>
-            <a:ext cx="5786478" cy="707886"/>
-          </a:xfrm>
-          <a:prstGeom prst="rect">
-            <a:avLst/>
-          </a:prstGeom>
-        </p:spPr>
-        <p:txBody>
-          <a:bodyPr wrap="square">
-            <a:spAutoFit/>
-          </a:bodyPr>
-          <a:lstStyle/>
-          <a:p>
-            <a:r>
-              <a:rPr lang="es-AR" sz="4000" dirty="0" err="1" smtClean="0">
-                <a:latin typeface="Verdana" pitchFamily="34" charset="0"/>
-                <a:ea typeface="Verdana" pitchFamily="34" charset="0"/>
-                <a:cs typeface="Verdana" pitchFamily="34" charset="0"/>
-              </a:rPr>
-              <a:t>Preprocesamiento</a:t>
-            </a:r>
-            <a:endParaRPr lang="es-AR" sz="4000" dirty="0" smtClean="0">
-              <a:latin typeface="Verdana" pitchFamily="34" charset="0"/>
-              <a:ea typeface="Verdana" pitchFamily="34" charset="0"/>
-              <a:cs typeface="Verdana" pitchFamily="34" charset="0"/>
-            </a:endParaRPr>
-          </a:p>
-        </p:txBody>
-      </p:sp>
       <p:pic>
         <p:nvPicPr>
-          <p:cNvPr id="10" name="Picture 2" descr="D:\ProyectoFinal\Proyecto final\Logo_OpticalMarketing\iso2.png"/>
+          <p:cNvPr id="4098" name="Picture 2" descr="http://eandt.theiet.org/news/2011/jun/images/640_motion-capture_web.jpg"/>
           <p:cNvPicPr>
             <a:picLocks noChangeAspect="1" noChangeArrowheads="1"/>
           </p:cNvPicPr>
           <p:nvPr/>
         </p:nvPicPr>
         <p:blipFill>
-          <a:blip r:embed="rId4" cstate="print"/>
+          <a:blip r:embed="rId4"/>
           <a:srcRect/>
           <a:stretch>
             <a:fillRect/>
@@ -6614,8 +6975,8 @@
         </p:blipFill>
         <p:spPr bwMode="auto">
           <a:xfrm>
-            <a:off x="1071538" y="142852"/>
-            <a:ext cx="1071569" cy="1096743"/>
+            <a:off x="285720" y="1785926"/>
+            <a:ext cx="5258910" cy="3500462"/>
           </a:xfrm>
           <a:prstGeom prst="rect">
             <a:avLst/>
@@ -6655,6 +7016,39 @@
           <a:chExt cx="0" cy="0"/>
         </a:xfrm>
       </p:grpSpPr>
+      <p:pic>
+        <p:nvPicPr>
+          <p:cNvPr id="2050" name="Picture 2"/>
+          <p:cNvPicPr>
+            <a:picLocks noChangeAspect="1" noChangeArrowheads="1"/>
+          </p:cNvPicPr>
+          <p:nvPr/>
+        </p:nvPicPr>
+        <p:blipFill>
+          <a:blip r:embed="rId3"/>
+          <a:srcRect/>
+          <a:stretch>
+            <a:fillRect/>
+          </a:stretch>
+        </p:blipFill>
+        <p:spPr bwMode="auto">
+          <a:xfrm>
+            <a:off x="214282" y="2000240"/>
+            <a:ext cx="4730638" cy="3071834"/>
+          </a:xfrm>
+          <a:prstGeom prst="rect">
+            <a:avLst/>
+          </a:prstGeom>
+          <a:noFill/>
+          <a:ln w="9525">
+            <a:noFill/>
+            <a:miter lim="800000"/>
+            <a:headEnd/>
+            <a:tailEnd/>
+          </a:ln>
+          <a:effectLst/>
+        </p:spPr>
+      </p:pic>
       <p:sp>
         <p:nvSpPr>
           <p:cNvPr id="7" name="6 CuadroTexto"/>
@@ -6663,7 +7057,7 @@
         </p:nvSpPr>
         <p:spPr>
           <a:xfrm>
-            <a:off x="5000628" y="2000240"/>
+            <a:off x="5000628" y="1928802"/>
             <a:ext cx="3929090" cy="3970318"/>
           </a:xfrm>
           <a:prstGeom prst="rect">
@@ -6683,15 +7077,7 @@
             </a:pPr>
             <a:r>
               <a:rPr lang="es-AR" sz="2800" dirty="0" smtClean="0"/>
-              <a:t>Identificar componentes de imágenes </a:t>
-            </a:r>
-            <a:r>
-              <a:rPr lang="es-AR" sz="2800" dirty="0" err="1" smtClean="0"/>
-              <a:t>preprocesadas</a:t>
-            </a:r>
-            <a:r>
-              <a:rPr lang="es-AR" sz="2800" dirty="0" smtClean="0"/>
-              <a:t>.</a:t>
+              <a:t>Realizar filtrado sobre las imágenes para reconocer la figura humana.</a:t>
             </a:r>
           </a:p>
           <a:p>
@@ -6704,7 +7090,7 @@
             </a:pPr>
             <a:r>
               <a:rPr lang="es-AR" sz="2800" dirty="0" smtClean="0"/>
-              <a:t>Identificar contornos de personas.</a:t>
+              <a:t>Identificar inicialmente objetos.</a:t>
             </a:r>
           </a:p>
           <a:p>
@@ -6721,7 +7107,7 @@
             </a:pPr>
             <a:r>
               <a:rPr lang="es-AR" sz="2800" dirty="0" smtClean="0"/>
-              <a:t>Realizar conteo y posición.</a:t>
+              <a:t>Procesamiento de matrices de captura.</a:t>
             </a:r>
             <a:endParaRPr lang="es-AR" sz="2800" dirty="0"/>
           </a:p>
@@ -6735,8 +7121,8 @@
         </p:nvSpPr>
         <p:spPr>
           <a:xfrm>
-            <a:off x="2357422" y="285728"/>
-            <a:ext cx="5357850" cy="1323439"/>
+            <a:off x="2143108" y="571480"/>
+            <a:ext cx="5786478" cy="707886"/>
           </a:xfrm>
           <a:prstGeom prst="rect">
             <a:avLst/>
@@ -6749,12 +7135,12 @@
           <a:lstStyle/>
           <a:p>
             <a:r>
-              <a:rPr lang="es-AR" sz="4000" dirty="0" smtClean="0">
+              <a:rPr lang="es-AR" sz="4000" dirty="0" err="1" smtClean="0">
                 <a:latin typeface="Verdana" pitchFamily="34" charset="0"/>
                 <a:ea typeface="Verdana" pitchFamily="34" charset="0"/>
                 <a:cs typeface="Verdana" pitchFamily="34" charset="0"/>
               </a:rPr>
-              <a:t>Segmentación y Representación</a:t>
+              <a:t>Preprocesamiento</a:t>
             </a:r>
             <a:endParaRPr lang="es-AR" sz="4000" dirty="0" smtClean="0">
               <a:latin typeface="Verdana" pitchFamily="34" charset="0"/>
@@ -6773,7 +7159,7 @@
           <p:nvPr/>
         </p:nvPicPr>
         <p:blipFill>
-          <a:blip r:embed="rId3" cstate="print"/>
+          <a:blip r:embed="rId4" cstate="print"/>
           <a:srcRect/>
           <a:stretch>
             <a:fillRect/>
@@ -6783,32 +7169,6 @@
           <a:xfrm>
             <a:off x="1071538" y="142852"/>
             <a:ext cx="1071569" cy="1096743"/>
-          </a:xfrm>
-          <a:prstGeom prst="rect">
-            <a:avLst/>
-          </a:prstGeom>
-          <a:noFill/>
-        </p:spPr>
-      </p:pic>
-      <p:pic>
-        <p:nvPicPr>
-          <p:cNvPr id="43010" name="Picture 2" descr="http://blogs.mathworks.com/images/steve/2012/detected-people.jpg"/>
-          <p:cNvPicPr>
-            <a:picLocks noChangeAspect="1" noChangeArrowheads="1"/>
-          </p:cNvPicPr>
-          <p:nvPr/>
-        </p:nvPicPr>
-        <p:blipFill>
-          <a:blip r:embed="rId4"/>
-          <a:srcRect/>
-          <a:stretch>
-            <a:fillRect/>
-          </a:stretch>
-        </p:blipFill>
-        <p:spPr bwMode="auto">
-          <a:xfrm>
-            <a:off x="142843" y="2214554"/>
-            <a:ext cx="4702661" cy="3429024"/>
           </a:xfrm>
           <a:prstGeom prst="rect">
             <a:avLst/>
@@ -6876,7 +7236,15 @@
             </a:pPr>
             <a:r>
               <a:rPr lang="es-AR" sz="2800" dirty="0" smtClean="0"/>
-              <a:t>Reconstruir el esqueleto humano.</a:t>
+              <a:t>Identificar componentes de imágenes </a:t>
+            </a:r>
+            <a:r>
+              <a:rPr lang="es-AR" sz="2800" dirty="0" err="1" smtClean="0"/>
+              <a:t>preprocesadas</a:t>
+            </a:r>
+            <a:r>
+              <a:rPr lang="es-AR" sz="2800" dirty="0" smtClean="0"/>
+              <a:t>.</a:t>
             </a:r>
           </a:p>
           <a:p>
@@ -6889,7 +7257,7 @@
             </a:pPr>
             <a:r>
               <a:rPr lang="es-AR" sz="2800" dirty="0" smtClean="0"/>
-              <a:t>Proveer un set de aplicaciones de avisos interactivos.</a:t>
+              <a:t>Identificar contornos de personas.</a:t>
             </a:r>
           </a:p>
           <a:p>
@@ -6906,7 +7274,7 @@
             </a:pPr>
             <a:r>
               <a:rPr lang="es-AR" sz="2800" dirty="0" smtClean="0"/>
-              <a:t>Extraer datos de la interacciones.</a:t>
+              <a:t>Realizar conteo y posición.</a:t>
             </a:r>
             <a:endParaRPr lang="es-AR" sz="2800" dirty="0"/>
           </a:p>
@@ -6920,8 +7288,8 @@
         </p:nvSpPr>
         <p:spPr>
           <a:xfrm>
-            <a:off x="2357422" y="500042"/>
-            <a:ext cx="5357850" cy="707886"/>
+            <a:off x="2357422" y="285728"/>
+            <a:ext cx="5357850" cy="1323439"/>
           </a:xfrm>
           <a:prstGeom prst="rect">
             <a:avLst/>
@@ -6939,13 +7307,8 @@
                 <a:ea typeface="Verdana" pitchFamily="34" charset="0"/>
                 <a:cs typeface="Verdana" pitchFamily="34" charset="0"/>
               </a:rPr>
-              <a:t>Interacción</a:t>
-            </a:r>
-            <a:endParaRPr lang="es-AR" sz="4000" dirty="0" smtClean="0">
-              <a:latin typeface="Verdana" pitchFamily="34" charset="0"/>
-              <a:ea typeface="Verdana" pitchFamily="34" charset="0"/>
-              <a:cs typeface="Verdana" pitchFamily="34" charset="0"/>
-            </a:endParaRPr>
+              <a:t>Segmentación y Representación</a:t>
+            </a:r>
           </a:p>
         </p:txBody>
       </p:sp>
@@ -6977,7 +7340,7 @@
       </p:pic>
       <p:pic>
         <p:nvPicPr>
-          <p:cNvPr id="45058" name="Picture 2" descr="http://blogs.microsoft.co.il/blogs/shair/image_thumb_3FB96E86.png"/>
+          <p:cNvPr id="43010" name="Picture 2" descr="http://blogs.mathworks.com/images/steve/2012/detected-people.jpg"/>
           <p:cNvPicPr>
             <a:picLocks noChangeAspect="1" noChangeArrowheads="1"/>
           </p:cNvPicPr>
@@ -6992,8 +7355,8 @@
         </p:blipFill>
         <p:spPr bwMode="auto">
           <a:xfrm>
-            <a:off x="142844" y="2071678"/>
-            <a:ext cx="4714907" cy="3864022"/>
+            <a:off x="142843" y="2214554"/>
+            <a:ext cx="4702661" cy="3429024"/>
           </a:xfrm>
           <a:prstGeom prst="rect">
             <a:avLst/>
@@ -7042,7 +7405,7 @@
         <p:spPr>
           <a:xfrm>
             <a:off x="5000628" y="2000240"/>
-            <a:ext cx="3929090" cy="4401205"/>
+            <a:ext cx="3929090" cy="3970318"/>
           </a:xfrm>
           <a:prstGeom prst="rect">
             <a:avLst/>
@@ -7061,7 +7424,7 @@
             </a:pPr>
             <a:r>
               <a:rPr lang="es-AR" sz="2800" dirty="0" smtClean="0"/>
-              <a:t>Administrar campañas y anuncios publicitarios.</a:t>
+              <a:t>Reconstruir el esqueleto humano.</a:t>
             </a:r>
           </a:p>
           <a:p>
@@ -7074,7 +7437,7 @@
             </a:pPr>
             <a:r>
               <a:rPr lang="es-AR" sz="2800" dirty="0" smtClean="0"/>
-              <a:t>Evaluar rendimientos de campañas y proveer informes.</a:t>
+              <a:t>Proveer un set de aplicaciones de avisos interactivos.</a:t>
             </a:r>
           </a:p>
           <a:p>
@@ -7091,7 +7454,7 @@
             </a:pPr>
             <a:r>
               <a:rPr lang="es-AR" sz="2800" dirty="0" smtClean="0"/>
-              <a:t>Proveer información en tiempo real de todos los puestos publicitarios.</a:t>
+              <a:t>Extraer datos de la interacciones.</a:t>
             </a:r>
             <a:endParaRPr lang="es-AR" sz="2800" dirty="0"/>
           </a:p>
@@ -7105,7 +7468,7 @@
         </p:nvSpPr>
         <p:spPr>
           <a:xfrm>
-            <a:off x="1714480" y="500042"/>
+            <a:off x="2357422" y="500042"/>
             <a:ext cx="5357850" cy="707886"/>
           </a:xfrm>
           <a:prstGeom prst="rect">
@@ -7124,13 +7487,8 @@
                 <a:ea typeface="Verdana" pitchFamily="34" charset="0"/>
                 <a:cs typeface="Verdana" pitchFamily="34" charset="0"/>
               </a:rPr>
-              <a:t>Web</a:t>
-            </a:r>
-            <a:endParaRPr lang="es-AR" sz="4000" dirty="0" smtClean="0">
-              <a:latin typeface="Verdana" pitchFamily="34" charset="0"/>
-              <a:ea typeface="Verdana" pitchFamily="34" charset="0"/>
-              <a:cs typeface="Verdana" pitchFamily="34" charset="0"/>
-            </a:endParaRPr>
+              <a:t>Interacción</a:t>
+            </a:r>
           </a:p>
         </p:txBody>
       </p:sp>
@@ -7151,7 +7509,7 @@
         </p:blipFill>
         <p:spPr bwMode="auto">
           <a:xfrm>
-            <a:off x="357158" y="142852"/>
+            <a:off x="1071538" y="142852"/>
             <a:ext cx="1071569" cy="1096743"/>
           </a:xfrm>
           <a:prstGeom prst="rect">
@@ -7160,69 +7518,9 @@
           <a:noFill/>
         </p:spPr>
       </p:pic>
-      <p:sp>
-        <p:nvSpPr>
-          <p:cNvPr id="47106" name="AutoShape 2" descr="Imágenes integradas 1"/>
-          <p:cNvSpPr>
-            <a:spLocks noChangeAspect="1" noChangeArrowheads="1"/>
-          </p:cNvSpPr>
-          <p:nvPr/>
-        </p:nvSpPr>
-        <p:spPr bwMode="auto">
-          <a:xfrm>
-            <a:off x="155575" y="-144463"/>
-            <a:ext cx="304800" cy="304801"/>
-          </a:xfrm>
-          <a:prstGeom prst="rect">
-            <a:avLst/>
-          </a:prstGeom>
-          <a:noFill/>
-        </p:spPr>
-        <p:txBody>
-          <a:bodyPr vert="horz" wrap="square" lIns="91440" tIns="45720" rIns="91440" bIns="45720" numCol="1" anchor="t" anchorCtr="0" compatLnSpc="1">
-            <a:prstTxWarp prst="textNoShape">
-              <a:avLst/>
-            </a:prstTxWarp>
-          </a:bodyPr>
-          <a:lstStyle/>
-          <a:p>
-            <a:endParaRPr lang="es-AR"/>
-          </a:p>
-        </p:txBody>
-      </p:sp>
-      <p:sp>
-        <p:nvSpPr>
-          <p:cNvPr id="47108" name="AutoShape 4" descr="Imágenes integradas 1"/>
-          <p:cNvSpPr>
-            <a:spLocks noChangeAspect="1" noChangeArrowheads="1"/>
-          </p:cNvSpPr>
-          <p:nvPr/>
-        </p:nvSpPr>
-        <p:spPr bwMode="auto">
-          <a:xfrm>
-            <a:off x="155575" y="-144463"/>
-            <a:ext cx="304800" cy="304801"/>
-          </a:xfrm>
-          <a:prstGeom prst="rect">
-            <a:avLst/>
-          </a:prstGeom>
-          <a:noFill/>
-        </p:spPr>
-        <p:txBody>
-          <a:bodyPr vert="horz" wrap="square" lIns="91440" tIns="45720" rIns="91440" bIns="45720" numCol="1" anchor="t" anchorCtr="0" compatLnSpc="1">
-            <a:prstTxWarp prst="textNoShape">
-              <a:avLst/>
-            </a:prstTxWarp>
-          </a:bodyPr>
-          <a:lstStyle/>
-          <a:p>
-            <a:endParaRPr lang="es-AR"/>
-          </a:p>
-        </p:txBody>
-      </p:sp>
       <p:pic>
         <p:nvPicPr>
-          <p:cNvPr id="47109" name="Picture 5" descr="C:\Users\PC ACER\Dropbox\image.png"/>
+          <p:cNvPr id="45058" name="Picture 2" descr="http://blogs.microsoft.co.il/blogs/shair/image_thumb_3FB96E86.png"/>
           <p:cNvPicPr>
             <a:picLocks noChangeAspect="1" noChangeArrowheads="1"/>
           </p:cNvPicPr>
@@ -7237,8 +7535,8 @@
         </p:blipFill>
         <p:spPr bwMode="auto">
           <a:xfrm>
-            <a:off x="214282" y="2000240"/>
-            <a:ext cx="4612208" cy="4143404"/>
+            <a:off x="142844" y="2071678"/>
+            <a:ext cx="4714907" cy="3864022"/>
           </a:xfrm>
           <a:prstGeom prst="rect">
             <a:avLst/>
@@ -7280,14 +7578,78 @@
       </p:grpSpPr>
       <p:sp>
         <p:nvSpPr>
+          <p:cNvPr id="7" name="6 CuadroTexto"/>
+          <p:cNvSpPr txBox="1"/>
+          <p:nvPr/>
+        </p:nvSpPr>
+        <p:spPr>
+          <a:xfrm>
+            <a:off x="5000628" y="2000240"/>
+            <a:ext cx="3929090" cy="4401205"/>
+          </a:xfrm>
+          <a:prstGeom prst="rect">
+            <a:avLst/>
+          </a:prstGeom>
+          <a:noFill/>
+        </p:spPr>
+        <p:txBody>
+          <a:bodyPr wrap="square" rtlCol="0">
+            <a:spAutoFit/>
+          </a:bodyPr>
+          <a:lstStyle/>
+          <a:p>
+            <a:pPr>
+              <a:buFont typeface="Arial" pitchFamily="34" charset="0"/>
+              <a:buChar char="•"/>
+            </a:pPr>
+            <a:r>
+              <a:rPr lang="es-AR" sz="2800" dirty="0" smtClean="0"/>
+              <a:t>Administrar campañas y anuncios publicitarios.</a:t>
+            </a:r>
+          </a:p>
+          <a:p>
+            <a:endParaRPr lang="es-AR" sz="2800" dirty="0" smtClean="0"/>
+          </a:p>
+          <a:p>
+            <a:pPr>
+              <a:buFont typeface="Arial" pitchFamily="34" charset="0"/>
+              <a:buChar char="•"/>
+            </a:pPr>
+            <a:r>
+              <a:rPr lang="es-AR" sz="2800" dirty="0" smtClean="0"/>
+              <a:t>Evaluar rendimientos de campañas y proveer informes.</a:t>
+            </a:r>
+          </a:p>
+          <a:p>
+            <a:pPr>
+              <a:buFont typeface="Arial" pitchFamily="34" charset="0"/>
+              <a:buChar char="•"/>
+            </a:pPr>
+            <a:endParaRPr lang="es-AR" sz="2800" dirty="0" smtClean="0"/>
+          </a:p>
+          <a:p>
+            <a:pPr>
+              <a:buFont typeface="Arial" pitchFamily="34" charset="0"/>
+              <a:buChar char="•"/>
+            </a:pPr>
+            <a:r>
+              <a:rPr lang="es-AR" sz="2800" dirty="0" smtClean="0"/>
+              <a:t>Proveer información en tiempo real de todos los puestos publicitarios.</a:t>
+            </a:r>
+            <a:endParaRPr lang="es-AR" sz="2800" dirty="0"/>
+          </a:p>
+        </p:txBody>
+      </p:sp>
+      <p:sp>
+        <p:nvSpPr>
           <p:cNvPr id="9" name="8 Rectángulo"/>
           <p:cNvSpPr/>
           <p:nvPr/>
         </p:nvSpPr>
         <p:spPr>
           <a:xfrm>
-            <a:off x="2571736" y="2357430"/>
-            <a:ext cx="3929090" cy="1569660"/>
+            <a:off x="1714480" y="500042"/>
+            <a:ext cx="5357850" cy="707886"/>
           </a:xfrm>
           <a:prstGeom prst="rect">
             <a:avLst/>
@@ -7300,18 +7662,13 @@
           <a:lstStyle/>
           <a:p>
             <a:r>
-              <a:rPr lang="es-AR" sz="9600" dirty="0" smtClean="0">
+              <a:rPr lang="es-AR" sz="4000" dirty="0" smtClean="0">
                 <a:latin typeface="Verdana" pitchFamily="34" charset="0"/>
                 <a:ea typeface="Verdana" pitchFamily="34" charset="0"/>
                 <a:cs typeface="Verdana" pitchFamily="34" charset="0"/>
               </a:rPr>
-              <a:t>Demo</a:t>
-            </a:r>
-            <a:endParaRPr lang="es-AR" sz="9600" dirty="0" smtClean="0">
-              <a:latin typeface="Verdana" pitchFamily="34" charset="0"/>
-              <a:ea typeface="Verdana" pitchFamily="34" charset="0"/>
-              <a:cs typeface="Verdana" pitchFamily="34" charset="0"/>
-            </a:endParaRPr>
+              <a:t>Web</a:t>
+            </a:r>
           </a:p>
         </p:txBody>
       </p:sp>
@@ -7332,8 +7689,8 @@
         </p:blipFill>
         <p:spPr bwMode="auto">
           <a:xfrm>
-            <a:off x="680624" y="2143116"/>
-            <a:ext cx="1605360" cy="1643074"/>
+            <a:off x="357158" y="142852"/>
+            <a:ext cx="1071569" cy="1096743"/>
           </a:xfrm>
           <a:prstGeom prst="rect">
             <a:avLst/>
@@ -7403,23 +7760,23 @@
       </p:sp>
       <p:pic>
         <p:nvPicPr>
-          <p:cNvPr id="8" name="Picture 2" descr="D:\ProyectoFinal\Proyecto final\Logo_OpticalMarketing\iso2.png"/>
+          <p:cNvPr id="47109" name="Picture 5" descr="C:\Users\PC ACER\Dropbox\image.png"/>
           <p:cNvPicPr>
             <a:picLocks noChangeAspect="1" noChangeArrowheads="1"/>
           </p:cNvPicPr>
           <p:nvPr/>
         </p:nvPicPr>
         <p:blipFill>
-          <a:blip r:embed="rId3" cstate="print"/>
+          <a:blip r:embed="rId4"/>
           <a:srcRect/>
           <a:stretch>
             <a:fillRect/>
           </a:stretch>
         </p:blipFill>
         <p:spPr bwMode="auto">
-          <a:xfrm flipH="1">
-            <a:off x="6572264" y="2143116"/>
-            <a:ext cx="1537912" cy="1643074"/>
+          <a:xfrm>
+            <a:off x="214282" y="2000240"/>
+            <a:ext cx="4612208" cy="4143404"/>
           </a:xfrm>
           <a:prstGeom prst="rect">
             <a:avLst/>
@@ -7459,9 +7816,41 @@
           <a:chExt cx="0" cy="0"/>
         </a:xfrm>
       </p:grpSpPr>
+      <p:sp>
+        <p:nvSpPr>
+          <p:cNvPr id="9" name="8 Rectángulo"/>
+          <p:cNvSpPr/>
+          <p:nvPr/>
+        </p:nvSpPr>
+        <p:spPr>
+          <a:xfrm>
+            <a:off x="2571736" y="2357430"/>
+            <a:ext cx="3929090" cy="1569660"/>
+          </a:xfrm>
+          <a:prstGeom prst="rect">
+            <a:avLst/>
+          </a:prstGeom>
+        </p:spPr>
+        <p:txBody>
+          <a:bodyPr wrap="square">
+            <a:spAutoFit/>
+          </a:bodyPr>
+          <a:lstStyle/>
+          <a:p>
+            <a:r>
+              <a:rPr lang="es-AR" sz="9600" dirty="0" smtClean="0">
+                <a:latin typeface="Verdana" pitchFamily="34" charset="0"/>
+                <a:ea typeface="Verdana" pitchFamily="34" charset="0"/>
+                <a:cs typeface="Verdana" pitchFamily="34" charset="0"/>
+              </a:rPr>
+              <a:t>Demo</a:t>
+            </a:r>
+          </a:p>
+        </p:txBody>
+      </p:sp>
       <p:pic>
         <p:nvPicPr>
-          <p:cNvPr id="3" name="Picture 2" descr="http://www.clker.com/cliparts/b/F/d/4/M/0/red-person-outline-hi.png"/>
+          <p:cNvPr id="10" name="Picture 2" descr="D:\ProyectoFinal\Proyecto final\Logo_OpticalMarketing\iso2.png"/>
           <p:cNvPicPr>
             <a:picLocks noChangeAspect="1" noChangeArrowheads="1"/>
           </p:cNvPicPr>
@@ -7476,8 +7865,8 @@
         </p:blipFill>
         <p:spPr bwMode="auto">
           <a:xfrm>
-            <a:off x="214282" y="857232"/>
-            <a:ext cx="830090" cy="785818"/>
+            <a:off x="680624" y="2143116"/>
+            <a:ext cx="1605360" cy="1643074"/>
           </a:xfrm>
           <a:prstGeom prst="rect">
             <a:avLst/>
@@ -7485,9 +7874,69 @@
           <a:noFill/>
         </p:spPr>
       </p:pic>
+      <p:sp>
+        <p:nvSpPr>
+          <p:cNvPr id="47106" name="AutoShape 2" descr="Imágenes integradas 1"/>
+          <p:cNvSpPr>
+            <a:spLocks noChangeAspect="1" noChangeArrowheads="1"/>
+          </p:cNvSpPr>
+          <p:nvPr/>
+        </p:nvSpPr>
+        <p:spPr bwMode="auto">
+          <a:xfrm>
+            <a:off x="155575" y="-144463"/>
+            <a:ext cx="304800" cy="304801"/>
+          </a:xfrm>
+          <a:prstGeom prst="rect">
+            <a:avLst/>
+          </a:prstGeom>
+          <a:noFill/>
+        </p:spPr>
+        <p:txBody>
+          <a:bodyPr vert="horz" wrap="square" lIns="91440" tIns="45720" rIns="91440" bIns="45720" numCol="1" anchor="t" anchorCtr="0" compatLnSpc="1">
+            <a:prstTxWarp prst="textNoShape">
+              <a:avLst/>
+            </a:prstTxWarp>
+          </a:bodyPr>
+          <a:lstStyle/>
+          <a:p>
+            <a:endParaRPr lang="es-AR"/>
+          </a:p>
+        </p:txBody>
+      </p:sp>
+      <p:sp>
+        <p:nvSpPr>
+          <p:cNvPr id="47108" name="AutoShape 4" descr="Imágenes integradas 1"/>
+          <p:cNvSpPr>
+            <a:spLocks noChangeAspect="1" noChangeArrowheads="1"/>
+          </p:cNvSpPr>
+          <p:nvPr/>
+        </p:nvSpPr>
+        <p:spPr bwMode="auto">
+          <a:xfrm>
+            <a:off x="155575" y="-144463"/>
+            <a:ext cx="304800" cy="304801"/>
+          </a:xfrm>
+          <a:prstGeom prst="rect">
+            <a:avLst/>
+          </a:prstGeom>
+          <a:noFill/>
+        </p:spPr>
+        <p:txBody>
+          <a:bodyPr vert="horz" wrap="square" lIns="91440" tIns="45720" rIns="91440" bIns="45720" numCol="1" anchor="t" anchorCtr="0" compatLnSpc="1">
+            <a:prstTxWarp prst="textNoShape">
+              <a:avLst/>
+            </a:prstTxWarp>
+          </a:bodyPr>
+          <a:lstStyle/>
+          <a:p>
+            <a:endParaRPr lang="es-AR"/>
+          </a:p>
+        </p:txBody>
+      </p:sp>
       <p:pic>
         <p:nvPicPr>
-          <p:cNvPr id="9" name="Picture 2" descr="http://www.clker.com/cliparts/b/F/d/4/M/0/red-person-outline-hi.png"/>
+          <p:cNvPr id="8" name="Picture 2" descr="D:\ProyectoFinal\Proyecto final\Logo_OpticalMarketing\iso2.png"/>
           <p:cNvPicPr>
             <a:picLocks noChangeAspect="1" noChangeArrowheads="1"/>
           </p:cNvPicPr>
@@ -7501,1208 +7950,9 @@
           </a:stretch>
         </p:blipFill>
         <p:spPr bwMode="auto">
-          <a:xfrm>
-            <a:off x="142844" y="5214950"/>
-            <a:ext cx="830090" cy="785818"/>
-          </a:xfrm>
-          <a:prstGeom prst="rect">
-            <a:avLst/>
-          </a:prstGeom>
-          <a:noFill/>
-        </p:spPr>
-      </p:pic>
-      <p:cxnSp>
-        <p:nvCxnSpPr>
-          <p:cNvPr id="13" name="12 Conector recto"/>
-          <p:cNvCxnSpPr>
-            <a:stCxn id="9" idx="3"/>
-            <a:endCxn id="9" idx="3"/>
-          </p:cNvCxnSpPr>
-          <p:nvPr/>
-        </p:nvCxnSpPr>
-        <p:spPr>
-          <a:xfrm>
-            <a:off x="972934" y="5607859"/>
-            <a:ext cx="1588" cy="1588"/>
-          </a:xfrm>
-          <a:prstGeom prst="line">
-            <a:avLst/>
-          </a:prstGeom>
-        </p:spPr>
-        <p:style>
-          <a:lnRef idx="1">
-            <a:schemeClr val="accent1"/>
-          </a:lnRef>
-          <a:fillRef idx="0">
-            <a:schemeClr val="accent1"/>
-          </a:fillRef>
-          <a:effectRef idx="0">
-            <a:schemeClr val="accent1"/>
-          </a:effectRef>
-          <a:fontRef idx="minor">
-            <a:schemeClr val="tx1"/>
-          </a:fontRef>
-        </p:style>
-      </p:cxnSp>
-      <p:pic>
-        <p:nvPicPr>
-          <p:cNvPr id="1026" name="Picture 2" descr="D:\ProyectoFinal\Proyecto final\Logo_OpticalMarketing\iso2.png"/>
-          <p:cNvPicPr>
-            <a:picLocks noChangeAspect="1" noChangeArrowheads="1"/>
-          </p:cNvPicPr>
-          <p:nvPr/>
-        </p:nvPicPr>
-        <p:blipFill>
-          <a:blip r:embed="rId4" cstate="print"/>
-          <a:srcRect/>
-          <a:stretch>
-            <a:fillRect/>
-          </a:stretch>
-        </p:blipFill>
-        <p:spPr bwMode="auto">
-          <a:xfrm>
-            <a:off x="3929058" y="2643182"/>
-            <a:ext cx="1071569" cy="1096743"/>
-          </a:xfrm>
-          <a:prstGeom prst="rect">
-            <a:avLst/>
-          </a:prstGeom>
-          <a:noFill/>
-        </p:spPr>
-      </p:pic>
-      <p:pic>
-        <p:nvPicPr>
-          <p:cNvPr id="18" name="Picture 5" descr="https://si0.twimg.com/profile_images/97538866/UniPersonLogoGS_red.gif"/>
-          <p:cNvPicPr>
-            <a:picLocks noChangeAspect="1" noChangeArrowheads="1"/>
-          </p:cNvPicPr>
-          <p:nvPr/>
-        </p:nvPicPr>
-        <p:blipFill>
-          <a:blip r:embed="rId5"/>
-          <a:srcRect/>
-          <a:stretch>
-            <a:fillRect/>
-          </a:stretch>
-        </p:blipFill>
-        <p:spPr bwMode="auto">
-          <a:xfrm>
-            <a:off x="8224656" y="5429264"/>
-            <a:ext cx="776500" cy="857256"/>
-          </a:xfrm>
-          <a:prstGeom prst="rect">
-            <a:avLst/>
-          </a:prstGeom>
-          <a:noFill/>
-        </p:spPr>
-      </p:pic>
-      <p:pic>
-        <p:nvPicPr>
-          <p:cNvPr id="1027" name="Picture 3" descr="C:\Users\PC ACER\Dropbox\OpticalMarketing\images\LED-TV.jpg"/>
-          <p:cNvPicPr>
-            <a:picLocks noChangeAspect="1" noChangeArrowheads="1"/>
-          </p:cNvPicPr>
-          <p:nvPr/>
-        </p:nvPicPr>
-        <p:blipFill>
-          <a:blip r:embed="rId6" cstate="print"/>
-          <a:srcRect/>
-          <a:stretch>
-            <a:fillRect/>
-          </a:stretch>
-        </p:blipFill>
-        <p:spPr bwMode="auto">
-          <a:xfrm>
-            <a:off x="6786578" y="5457397"/>
-            <a:ext cx="928694" cy="829123"/>
-          </a:xfrm>
-          <a:prstGeom prst="rect">
-            <a:avLst/>
-          </a:prstGeom>
-          <a:noFill/>
-        </p:spPr>
-      </p:pic>
-      <p:pic>
-        <p:nvPicPr>
-          <p:cNvPr id="20" name="Picture 5" descr="https://si0.twimg.com/profile_images/97538866/UniPersonLogoGS_red.gif"/>
-          <p:cNvPicPr>
-            <a:picLocks noChangeAspect="1" noChangeArrowheads="1"/>
-          </p:cNvPicPr>
-          <p:nvPr/>
-        </p:nvPicPr>
-        <p:blipFill>
-          <a:blip r:embed="rId5"/>
-          <a:srcRect/>
-          <a:stretch>
-            <a:fillRect/>
-          </a:stretch>
-        </p:blipFill>
-        <p:spPr bwMode="auto">
-          <a:xfrm>
-            <a:off x="8296094" y="3071810"/>
-            <a:ext cx="776500" cy="857256"/>
-          </a:xfrm>
-          <a:prstGeom prst="rect">
-            <a:avLst/>
-          </a:prstGeom>
-          <a:noFill/>
-        </p:spPr>
-      </p:pic>
-      <p:pic>
-        <p:nvPicPr>
-          <p:cNvPr id="21" name="Picture 5" descr="https://si0.twimg.com/profile_images/97538866/UniPersonLogoGS_red.gif"/>
-          <p:cNvPicPr>
-            <a:picLocks noChangeAspect="1" noChangeArrowheads="1"/>
-          </p:cNvPicPr>
-          <p:nvPr/>
-        </p:nvPicPr>
-        <p:blipFill>
-          <a:blip r:embed="rId5"/>
-          <a:srcRect/>
-          <a:stretch>
-            <a:fillRect/>
-          </a:stretch>
-        </p:blipFill>
-        <p:spPr bwMode="auto">
-          <a:xfrm>
-            <a:off x="8296094" y="928670"/>
-            <a:ext cx="776500" cy="857256"/>
-          </a:xfrm>
-          <a:prstGeom prst="rect">
-            <a:avLst/>
-          </a:prstGeom>
-          <a:noFill/>
-        </p:spPr>
-      </p:pic>
-      <p:pic>
-        <p:nvPicPr>
-          <p:cNvPr id="22" name="Picture 3" descr="C:\Users\PC ACER\Dropbox\OpticalMarketing\images\LED-TV.jpg"/>
-          <p:cNvPicPr>
-            <a:picLocks noChangeAspect="1" noChangeArrowheads="1"/>
-          </p:cNvPicPr>
-          <p:nvPr/>
-        </p:nvPicPr>
-        <p:blipFill>
-          <a:blip r:embed="rId6" cstate="print"/>
-          <a:srcRect/>
-          <a:stretch>
-            <a:fillRect/>
-          </a:stretch>
-        </p:blipFill>
-        <p:spPr bwMode="auto">
-          <a:xfrm>
-            <a:off x="6858016" y="3143248"/>
-            <a:ext cx="928694" cy="829123"/>
-          </a:xfrm>
-          <a:prstGeom prst="rect">
-            <a:avLst/>
-          </a:prstGeom>
-          <a:noFill/>
-        </p:spPr>
-      </p:pic>
-      <p:pic>
-        <p:nvPicPr>
-          <p:cNvPr id="23" name="Picture 3" descr="C:\Users\PC ACER\Dropbox\OpticalMarketing\images\LED-TV.jpg"/>
-          <p:cNvPicPr>
-            <a:picLocks noChangeAspect="1" noChangeArrowheads="1"/>
-          </p:cNvPicPr>
-          <p:nvPr/>
-        </p:nvPicPr>
-        <p:blipFill>
-          <a:blip r:embed="rId6" cstate="print"/>
-          <a:srcRect/>
-          <a:stretch>
-            <a:fillRect/>
-          </a:stretch>
-        </p:blipFill>
-        <p:spPr bwMode="auto">
-          <a:xfrm>
-            <a:off x="6858016" y="1000108"/>
-            <a:ext cx="928694" cy="829123"/>
-          </a:xfrm>
-          <a:prstGeom prst="rect">
-            <a:avLst/>
-          </a:prstGeom>
-          <a:noFill/>
-        </p:spPr>
-      </p:pic>
-      <p:pic>
-        <p:nvPicPr>
-          <p:cNvPr id="1028" name="Picture 4" descr="C:\Users\PC ACER\Dropbox\OpticalMarketing\images\kinect-20100613095509272-1024x640 (1).jpg"/>
-          <p:cNvPicPr>
-            <a:picLocks noChangeAspect="1" noChangeArrowheads="1"/>
-          </p:cNvPicPr>
-          <p:nvPr/>
-        </p:nvPicPr>
-        <p:blipFill>
-          <a:blip r:embed="rId7" cstate="print"/>
-          <a:srcRect/>
-          <a:stretch>
-            <a:fillRect/>
-          </a:stretch>
-        </p:blipFill>
-        <p:spPr bwMode="auto">
-          <a:xfrm>
-            <a:off x="6715140" y="5129624"/>
-            <a:ext cx="1095350" cy="371078"/>
-          </a:xfrm>
-          <a:prstGeom prst="rect">
-            <a:avLst/>
-          </a:prstGeom>
-          <a:noFill/>
-        </p:spPr>
-      </p:pic>
-      <p:pic>
-        <p:nvPicPr>
-          <p:cNvPr id="25" name="Picture 4" descr="C:\Users\PC ACER\Dropbox\OpticalMarketing\images\kinect-20100613095509272-1024x640 (1).jpg"/>
-          <p:cNvPicPr>
-            <a:picLocks noChangeAspect="1" noChangeArrowheads="1"/>
-          </p:cNvPicPr>
-          <p:nvPr/>
-        </p:nvPicPr>
-        <p:blipFill>
-          <a:blip r:embed="rId7" cstate="print"/>
-          <a:srcRect/>
-          <a:stretch>
-            <a:fillRect/>
-          </a:stretch>
-        </p:blipFill>
-        <p:spPr bwMode="auto">
-          <a:xfrm>
-            <a:off x="6786578" y="2786058"/>
-            <a:ext cx="1095350" cy="371078"/>
-          </a:xfrm>
-          <a:prstGeom prst="rect">
-            <a:avLst/>
-          </a:prstGeom>
-          <a:noFill/>
-        </p:spPr>
-      </p:pic>
-      <p:pic>
-        <p:nvPicPr>
-          <p:cNvPr id="26" name="Picture 4" descr="C:\Users\PC ACER\Dropbox\OpticalMarketing\images\kinect-20100613095509272-1024x640 (1).jpg"/>
-          <p:cNvPicPr>
-            <a:picLocks noChangeAspect="1" noChangeArrowheads="1"/>
-          </p:cNvPicPr>
-          <p:nvPr/>
-        </p:nvPicPr>
-        <p:blipFill>
-          <a:blip r:embed="rId7" cstate="print"/>
-          <a:srcRect/>
-          <a:stretch>
-            <a:fillRect/>
-          </a:stretch>
-        </p:blipFill>
-        <p:spPr bwMode="auto">
-          <a:xfrm>
-            <a:off x="6762798" y="700468"/>
-            <a:ext cx="1095350" cy="371078"/>
-          </a:xfrm>
-          <a:prstGeom prst="rect">
-            <a:avLst/>
-          </a:prstGeom>
-          <a:noFill/>
-        </p:spPr>
-      </p:pic>
-      <p:sp>
-        <p:nvSpPr>
-          <p:cNvPr id="1030" name="AutoShape 6" descr="Imágenes integradas 1"/>
-          <p:cNvSpPr>
-            <a:spLocks noChangeAspect="1" noChangeArrowheads="1"/>
-          </p:cNvSpPr>
-          <p:nvPr/>
-        </p:nvSpPr>
-        <p:spPr bwMode="auto">
-          <a:xfrm>
-            <a:off x="155575" y="-144463"/>
-            <a:ext cx="304800" cy="304801"/>
-          </a:xfrm>
-          <a:prstGeom prst="rect">
-            <a:avLst/>
-          </a:prstGeom>
-          <a:noFill/>
-        </p:spPr>
-        <p:txBody>
-          <a:bodyPr vert="horz" wrap="square" lIns="91440" tIns="45720" rIns="91440" bIns="45720" numCol="1" anchor="t" anchorCtr="0" compatLnSpc="1">
-            <a:prstTxWarp prst="textNoShape">
-              <a:avLst/>
-            </a:prstTxWarp>
-          </a:bodyPr>
-          <a:lstStyle/>
-          <a:p>
-            <a:endParaRPr lang="es-AR"/>
-          </a:p>
-        </p:txBody>
-      </p:sp>
-      <p:sp>
-        <p:nvSpPr>
-          <p:cNvPr id="1032" name="AutoShape 8" descr="Imágenes integradas 1"/>
-          <p:cNvSpPr>
-            <a:spLocks noChangeAspect="1" noChangeArrowheads="1"/>
-          </p:cNvSpPr>
-          <p:nvPr/>
-        </p:nvSpPr>
-        <p:spPr bwMode="auto">
-          <a:xfrm>
-            <a:off x="155575" y="-144463"/>
-            <a:ext cx="304800" cy="304801"/>
-          </a:xfrm>
-          <a:prstGeom prst="rect">
-            <a:avLst/>
-          </a:prstGeom>
-          <a:noFill/>
-        </p:spPr>
-        <p:txBody>
-          <a:bodyPr vert="horz" wrap="square" lIns="91440" tIns="45720" rIns="91440" bIns="45720" numCol="1" anchor="t" anchorCtr="0" compatLnSpc="1">
-            <a:prstTxWarp prst="textNoShape">
-              <a:avLst/>
-            </a:prstTxWarp>
-          </a:bodyPr>
-          <a:lstStyle/>
-          <a:p>
-            <a:endParaRPr lang="es-AR"/>
-          </a:p>
-        </p:txBody>
-      </p:sp>
-      <p:pic>
-        <p:nvPicPr>
-          <p:cNvPr id="1033" name="Picture 9"/>
-          <p:cNvPicPr>
-            <a:picLocks noChangeAspect="1" noChangeArrowheads="1"/>
-          </p:cNvPicPr>
-          <p:nvPr/>
-        </p:nvPicPr>
-        <p:blipFill>
-          <a:blip r:embed="rId8" cstate="print"/>
-          <a:srcRect/>
-          <a:stretch>
-            <a:fillRect/>
-          </a:stretch>
-        </p:blipFill>
-        <p:spPr bwMode="auto">
-          <a:xfrm>
-            <a:off x="1500166" y="4929198"/>
-            <a:ext cx="1749432" cy="1571612"/>
-          </a:xfrm>
-          <a:prstGeom prst="rect">
-            <a:avLst/>
-          </a:prstGeom>
-          <a:noFill/>
-          <a:ln w="9525">
-            <a:noFill/>
-            <a:miter lim="800000"/>
-            <a:headEnd/>
-            <a:tailEnd/>
-          </a:ln>
-          <a:effectLst/>
-        </p:spPr>
-      </p:pic>
-      <p:pic>
-        <p:nvPicPr>
-          <p:cNvPr id="30" name="Picture 9"/>
-          <p:cNvPicPr>
-            <a:picLocks noChangeAspect="1" noChangeArrowheads="1"/>
-          </p:cNvPicPr>
-          <p:nvPr/>
-        </p:nvPicPr>
-        <p:blipFill>
-          <a:blip r:embed="rId8" cstate="print"/>
-          <a:srcRect/>
-          <a:stretch>
-            <a:fillRect/>
-          </a:stretch>
-        </p:blipFill>
-        <p:spPr bwMode="auto">
-          <a:xfrm>
-            <a:off x="1643042" y="500042"/>
-            <a:ext cx="1749432" cy="1571612"/>
-          </a:xfrm>
-          <a:prstGeom prst="rect">
-            <a:avLst/>
-          </a:prstGeom>
-          <a:noFill/>
-          <a:ln w="9525">
-            <a:noFill/>
-            <a:miter lim="800000"/>
-            <a:headEnd/>
-            <a:tailEnd/>
-          </a:ln>
-          <a:effectLst/>
-        </p:spPr>
-      </p:pic>
-      <p:sp>
-        <p:nvSpPr>
-          <p:cNvPr id="32" name="31 Rectángulo"/>
-          <p:cNvSpPr/>
-          <p:nvPr/>
-        </p:nvSpPr>
-        <p:spPr>
-          <a:xfrm>
-            <a:off x="1643042" y="500042"/>
-            <a:ext cx="1785950" cy="1571636"/>
-          </a:xfrm>
-          <a:prstGeom prst="rect">
-            <a:avLst/>
-          </a:prstGeom>
-          <a:noFill/>
-          <a:ln>
-            <a:solidFill>
-              <a:schemeClr val="tx1"/>
-            </a:solidFill>
-          </a:ln>
-        </p:spPr>
-        <p:style>
-          <a:lnRef idx="2">
-            <a:schemeClr val="accent1">
-              <a:shade val="50000"/>
-            </a:schemeClr>
-          </a:lnRef>
-          <a:fillRef idx="1">
-            <a:schemeClr val="accent1"/>
-          </a:fillRef>
-          <a:effectRef idx="0">
-            <a:schemeClr val="accent1"/>
-          </a:effectRef>
-          <a:fontRef idx="minor">
-            <a:schemeClr val="lt1"/>
-          </a:fontRef>
-        </p:style>
-        <p:txBody>
-          <a:bodyPr rtlCol="0" anchor="ctr"/>
-          <a:lstStyle/>
-          <a:p>
-            <a:pPr algn="ctr"/>
-            <a:endParaRPr lang="es-AR"/>
-          </a:p>
-        </p:txBody>
-      </p:sp>
-      <p:sp>
-        <p:nvSpPr>
-          <p:cNvPr id="34" name="33 Rectángulo"/>
-          <p:cNvSpPr/>
-          <p:nvPr/>
-        </p:nvSpPr>
-        <p:spPr>
-          <a:xfrm>
-            <a:off x="1500166" y="4929198"/>
-            <a:ext cx="1785950" cy="1571636"/>
-          </a:xfrm>
-          <a:prstGeom prst="rect">
-            <a:avLst/>
-          </a:prstGeom>
-          <a:noFill/>
-          <a:ln>
-            <a:solidFill>
-              <a:schemeClr val="tx1"/>
-            </a:solidFill>
-          </a:ln>
-        </p:spPr>
-        <p:style>
-          <a:lnRef idx="2">
-            <a:schemeClr val="accent1">
-              <a:shade val="50000"/>
-            </a:schemeClr>
-          </a:lnRef>
-          <a:fillRef idx="1">
-            <a:schemeClr val="accent1"/>
-          </a:fillRef>
-          <a:effectRef idx="0">
-            <a:schemeClr val="accent1"/>
-          </a:effectRef>
-          <a:fontRef idx="minor">
-            <a:schemeClr val="lt1"/>
-          </a:fontRef>
-        </p:style>
-        <p:txBody>
-          <a:bodyPr rtlCol="0" anchor="ctr"/>
-          <a:lstStyle/>
-          <a:p>
-            <a:pPr algn="ctr"/>
-            <a:endParaRPr lang="es-AR"/>
-          </a:p>
-        </p:txBody>
-      </p:sp>
-      <p:sp>
-        <p:nvSpPr>
-          <p:cNvPr id="35" name="34 Flecha izquierda y derecha"/>
-          <p:cNvSpPr/>
-          <p:nvPr/>
-        </p:nvSpPr>
-        <p:spPr>
-          <a:xfrm>
-            <a:off x="1000100" y="1071546"/>
-            <a:ext cx="571504" cy="214314"/>
-          </a:xfrm>
-          <a:prstGeom prst="leftRightArrow">
-            <a:avLst/>
-          </a:prstGeom>
-        </p:spPr>
-        <p:style>
-          <a:lnRef idx="2">
-            <a:schemeClr val="accent1">
-              <a:shade val="50000"/>
-            </a:schemeClr>
-          </a:lnRef>
-          <a:fillRef idx="1">
-            <a:schemeClr val="accent1"/>
-          </a:fillRef>
-          <a:effectRef idx="0">
-            <a:schemeClr val="accent1"/>
-          </a:effectRef>
-          <a:fontRef idx="minor">
-            <a:schemeClr val="lt1"/>
-          </a:fontRef>
-        </p:style>
-        <p:txBody>
-          <a:bodyPr rtlCol="0" anchor="ctr"/>
-          <a:lstStyle/>
-          <a:p>
-            <a:pPr algn="ctr"/>
-            <a:endParaRPr lang="es-AR"/>
-          </a:p>
-        </p:txBody>
-      </p:sp>
-      <p:sp>
-        <p:nvSpPr>
-          <p:cNvPr id="36" name="35 Flecha izquierda y derecha"/>
-          <p:cNvSpPr/>
-          <p:nvPr/>
-        </p:nvSpPr>
-        <p:spPr>
-          <a:xfrm>
-            <a:off x="857224" y="5429264"/>
-            <a:ext cx="571504" cy="214314"/>
-          </a:xfrm>
-          <a:prstGeom prst="leftRightArrow">
-            <a:avLst/>
-          </a:prstGeom>
-        </p:spPr>
-        <p:style>
-          <a:lnRef idx="2">
-            <a:schemeClr val="accent1">
-              <a:shade val="50000"/>
-            </a:schemeClr>
-          </a:lnRef>
-          <a:fillRef idx="1">
-            <a:schemeClr val="accent1"/>
-          </a:fillRef>
-          <a:effectRef idx="0">
-            <a:schemeClr val="accent1"/>
-          </a:effectRef>
-          <a:fontRef idx="minor">
-            <a:schemeClr val="lt1"/>
-          </a:fontRef>
-        </p:style>
-        <p:txBody>
-          <a:bodyPr rtlCol="0" anchor="ctr"/>
-          <a:lstStyle/>
-          <a:p>
-            <a:pPr algn="ctr"/>
-            <a:endParaRPr lang="es-AR"/>
-          </a:p>
-        </p:txBody>
-      </p:sp>
-      <p:pic>
-        <p:nvPicPr>
-          <p:cNvPr id="1034" name="Picture 10" descr="D:\ProyectoFinal\Proyecto final\Logo_OpticalMarketing\gris.png"/>
-          <p:cNvPicPr>
-            <a:picLocks noChangeAspect="1" noChangeArrowheads="1"/>
-          </p:cNvPicPr>
-          <p:nvPr/>
-        </p:nvPicPr>
-        <p:blipFill>
-          <a:blip r:embed="rId9" cstate="print"/>
-          <a:srcRect/>
-          <a:stretch>
-            <a:fillRect/>
-          </a:stretch>
-        </p:blipFill>
-        <p:spPr bwMode="auto">
-          <a:xfrm>
-            <a:off x="3643306" y="3786190"/>
-            <a:ext cx="1857388" cy="410631"/>
-          </a:xfrm>
-          <a:prstGeom prst="rect">
-            <a:avLst/>
-          </a:prstGeom>
-          <a:noFill/>
-        </p:spPr>
-      </p:pic>
-      <p:sp>
-        <p:nvSpPr>
-          <p:cNvPr id="38" name="37 Elipse"/>
-          <p:cNvSpPr/>
-          <p:nvPr/>
-        </p:nvSpPr>
-        <p:spPr>
-          <a:xfrm>
-            <a:off x="3500430" y="2500306"/>
-            <a:ext cx="2143140" cy="2143140"/>
-          </a:xfrm>
-          <a:prstGeom prst="ellipse">
-            <a:avLst/>
-          </a:prstGeom>
-          <a:noFill/>
-          <a:ln w="50800">
-            <a:solidFill>
-              <a:srgbClr val="FF0000"/>
-            </a:solidFill>
-          </a:ln>
-        </p:spPr>
-        <p:style>
-          <a:lnRef idx="2">
-            <a:schemeClr val="accent1">
-              <a:shade val="50000"/>
-            </a:schemeClr>
-          </a:lnRef>
-          <a:fillRef idx="1">
-            <a:schemeClr val="accent1"/>
-          </a:fillRef>
-          <a:effectRef idx="0">
-            <a:schemeClr val="accent1"/>
-          </a:effectRef>
-          <a:fontRef idx="minor">
-            <a:schemeClr val="lt1"/>
-          </a:fontRef>
-        </p:style>
-        <p:txBody>
-          <a:bodyPr rtlCol="0" anchor="ctr"/>
-          <a:lstStyle/>
-          <a:p>
-            <a:pPr algn="ctr"/>
-            <a:endParaRPr lang="es-AR"/>
-          </a:p>
-        </p:txBody>
-      </p:sp>
-      <p:sp>
-        <p:nvSpPr>
-          <p:cNvPr id="39" name="38 Flecha izquierda y derecha"/>
-          <p:cNvSpPr/>
-          <p:nvPr/>
-        </p:nvSpPr>
-        <p:spPr>
-          <a:xfrm rot="3119671">
-            <a:off x="3097900" y="2405508"/>
-            <a:ext cx="758991" cy="190664"/>
-          </a:xfrm>
-          <a:prstGeom prst="leftRightArrow">
-            <a:avLst/>
-          </a:prstGeom>
-        </p:spPr>
-        <p:style>
-          <a:lnRef idx="2">
-            <a:schemeClr val="accent1">
-              <a:shade val="50000"/>
-            </a:schemeClr>
-          </a:lnRef>
-          <a:fillRef idx="1">
-            <a:schemeClr val="accent1"/>
-          </a:fillRef>
-          <a:effectRef idx="0">
-            <a:schemeClr val="accent1"/>
-          </a:effectRef>
-          <a:fontRef idx="minor">
-            <a:schemeClr val="lt1"/>
-          </a:fontRef>
-        </p:style>
-        <p:txBody>
-          <a:bodyPr rtlCol="0" anchor="ctr"/>
-          <a:lstStyle/>
-          <a:p>
-            <a:pPr algn="ctr"/>
-            <a:endParaRPr lang="es-AR"/>
-          </a:p>
-        </p:txBody>
-      </p:sp>
-      <p:sp>
-        <p:nvSpPr>
-          <p:cNvPr id="40" name="39 Flecha izquierda y derecha"/>
-          <p:cNvSpPr/>
-          <p:nvPr/>
-        </p:nvSpPr>
-        <p:spPr>
-          <a:xfrm rot="19280318">
-            <a:off x="3048192" y="4502441"/>
-            <a:ext cx="758991" cy="190664"/>
-          </a:xfrm>
-          <a:prstGeom prst="leftRightArrow">
-            <a:avLst/>
-          </a:prstGeom>
-        </p:spPr>
-        <p:style>
-          <a:lnRef idx="2">
-            <a:schemeClr val="accent1">
-              <a:shade val="50000"/>
-            </a:schemeClr>
-          </a:lnRef>
-          <a:fillRef idx="1">
-            <a:schemeClr val="accent1"/>
-          </a:fillRef>
-          <a:effectRef idx="0">
-            <a:schemeClr val="accent1"/>
-          </a:effectRef>
-          <a:fontRef idx="minor">
-            <a:schemeClr val="lt1"/>
-          </a:fontRef>
-        </p:style>
-        <p:txBody>
-          <a:bodyPr rtlCol="0" anchor="ctr"/>
-          <a:lstStyle/>
-          <a:p>
-            <a:pPr algn="ctr"/>
-            <a:endParaRPr lang="es-AR"/>
-          </a:p>
-        </p:txBody>
-      </p:sp>
-      <p:sp>
-        <p:nvSpPr>
-          <p:cNvPr id="41" name="40 Flecha izquierda y derecha"/>
-          <p:cNvSpPr/>
-          <p:nvPr/>
-        </p:nvSpPr>
-        <p:spPr>
-          <a:xfrm>
-            <a:off x="5857884" y="3500438"/>
-            <a:ext cx="758991" cy="190664"/>
-          </a:xfrm>
-          <a:prstGeom prst="leftRightArrow">
-            <a:avLst/>
-          </a:prstGeom>
-        </p:spPr>
-        <p:style>
-          <a:lnRef idx="2">
-            <a:schemeClr val="accent1">
-              <a:shade val="50000"/>
-            </a:schemeClr>
-          </a:lnRef>
-          <a:fillRef idx="1">
-            <a:schemeClr val="accent1"/>
-          </a:fillRef>
-          <a:effectRef idx="0">
-            <a:schemeClr val="accent1"/>
-          </a:effectRef>
-          <a:fontRef idx="minor">
-            <a:schemeClr val="lt1"/>
-          </a:fontRef>
-        </p:style>
-        <p:txBody>
-          <a:bodyPr rtlCol="0" anchor="ctr"/>
-          <a:lstStyle/>
-          <a:p>
-            <a:pPr algn="ctr"/>
-            <a:endParaRPr lang="es-AR"/>
-          </a:p>
-        </p:txBody>
-      </p:sp>
-      <p:sp>
-        <p:nvSpPr>
-          <p:cNvPr id="42" name="41 Flecha izquierda y derecha"/>
-          <p:cNvSpPr/>
-          <p:nvPr/>
-        </p:nvSpPr>
-        <p:spPr>
-          <a:xfrm rot="19280318">
-            <a:off x="5290055" y="2042724"/>
-            <a:ext cx="1349972" cy="200784"/>
-          </a:xfrm>
-          <a:prstGeom prst="leftRightArrow">
-            <a:avLst/>
-          </a:prstGeom>
-        </p:spPr>
-        <p:style>
-          <a:lnRef idx="2">
-            <a:schemeClr val="accent1">
-              <a:shade val="50000"/>
-            </a:schemeClr>
-          </a:lnRef>
-          <a:fillRef idx="1">
-            <a:schemeClr val="accent1"/>
-          </a:fillRef>
-          <a:effectRef idx="0">
-            <a:schemeClr val="accent1"/>
-          </a:effectRef>
-          <a:fontRef idx="minor">
-            <a:schemeClr val="lt1"/>
-          </a:fontRef>
-        </p:style>
-        <p:txBody>
-          <a:bodyPr rtlCol="0" anchor="ctr"/>
-          <a:lstStyle/>
-          <a:p>
-            <a:pPr algn="ctr"/>
-            <a:endParaRPr lang="es-AR"/>
-          </a:p>
-        </p:txBody>
-      </p:sp>
-      <p:sp>
-        <p:nvSpPr>
-          <p:cNvPr id="43" name="42 Flecha izquierda y derecha"/>
-          <p:cNvSpPr/>
-          <p:nvPr/>
-        </p:nvSpPr>
-        <p:spPr>
-          <a:xfrm rot="2539898">
-            <a:off x="5177989" y="4928944"/>
-            <a:ext cx="1349972" cy="200784"/>
-          </a:xfrm>
-          <a:prstGeom prst="leftRightArrow">
-            <a:avLst/>
-          </a:prstGeom>
-        </p:spPr>
-        <p:style>
-          <a:lnRef idx="2">
-            <a:schemeClr val="accent1">
-              <a:shade val="50000"/>
-            </a:schemeClr>
-          </a:lnRef>
-          <a:fillRef idx="1">
-            <a:schemeClr val="accent1"/>
-          </a:fillRef>
-          <a:effectRef idx="0">
-            <a:schemeClr val="accent1"/>
-          </a:effectRef>
-          <a:fontRef idx="minor">
-            <a:schemeClr val="lt1"/>
-          </a:fontRef>
-        </p:style>
-        <p:txBody>
-          <a:bodyPr rtlCol="0" anchor="ctr"/>
-          <a:lstStyle/>
-          <a:p>
-            <a:pPr algn="ctr"/>
-            <a:endParaRPr lang="es-AR"/>
-          </a:p>
-        </p:txBody>
-      </p:sp>
-      <p:sp>
-        <p:nvSpPr>
-          <p:cNvPr id="44" name="43 Flecha izquierda y derecha"/>
-          <p:cNvSpPr/>
-          <p:nvPr/>
-        </p:nvSpPr>
-        <p:spPr>
-          <a:xfrm>
-            <a:off x="7858148" y="1428736"/>
-            <a:ext cx="571504" cy="214314"/>
-          </a:xfrm>
-          <a:prstGeom prst="leftRightArrow">
-            <a:avLst/>
-          </a:prstGeom>
-        </p:spPr>
-        <p:style>
-          <a:lnRef idx="2">
-            <a:schemeClr val="accent1">
-              <a:shade val="50000"/>
-            </a:schemeClr>
-          </a:lnRef>
-          <a:fillRef idx="1">
-            <a:schemeClr val="accent1"/>
-          </a:fillRef>
-          <a:effectRef idx="0">
-            <a:schemeClr val="accent1"/>
-          </a:effectRef>
-          <a:fontRef idx="minor">
-            <a:schemeClr val="lt1"/>
-          </a:fontRef>
-        </p:style>
-        <p:txBody>
-          <a:bodyPr rtlCol="0" anchor="ctr"/>
-          <a:lstStyle/>
-          <a:p>
-            <a:pPr algn="ctr"/>
-            <a:endParaRPr lang="es-AR"/>
-          </a:p>
-        </p:txBody>
-      </p:sp>
-      <p:sp>
-        <p:nvSpPr>
-          <p:cNvPr id="45" name="44 Flecha izquierda y derecha"/>
-          <p:cNvSpPr/>
-          <p:nvPr/>
-        </p:nvSpPr>
-        <p:spPr>
-          <a:xfrm>
-            <a:off x="7858148" y="3500438"/>
-            <a:ext cx="571504" cy="214314"/>
-          </a:xfrm>
-          <a:prstGeom prst="leftRightArrow">
-            <a:avLst/>
-          </a:prstGeom>
-        </p:spPr>
-        <p:style>
-          <a:lnRef idx="2">
-            <a:schemeClr val="accent1">
-              <a:shade val="50000"/>
-            </a:schemeClr>
-          </a:lnRef>
-          <a:fillRef idx="1">
-            <a:schemeClr val="accent1"/>
-          </a:fillRef>
-          <a:effectRef idx="0">
-            <a:schemeClr val="accent1"/>
-          </a:effectRef>
-          <a:fontRef idx="minor">
-            <a:schemeClr val="lt1"/>
-          </a:fontRef>
-        </p:style>
-        <p:txBody>
-          <a:bodyPr rtlCol="0" anchor="ctr"/>
-          <a:lstStyle/>
-          <a:p>
-            <a:pPr algn="ctr"/>
-            <a:endParaRPr lang="es-AR"/>
-          </a:p>
-        </p:txBody>
-      </p:sp>
-      <p:sp>
-        <p:nvSpPr>
-          <p:cNvPr id="46" name="45 Flecha izquierda y derecha"/>
-          <p:cNvSpPr/>
-          <p:nvPr/>
-        </p:nvSpPr>
-        <p:spPr>
-          <a:xfrm>
-            <a:off x="7858148" y="5929330"/>
-            <a:ext cx="571504" cy="214314"/>
-          </a:xfrm>
-          <a:prstGeom prst="leftRightArrow">
-            <a:avLst/>
-          </a:prstGeom>
-        </p:spPr>
-        <p:style>
-          <a:lnRef idx="2">
-            <a:schemeClr val="accent1">
-              <a:shade val="50000"/>
-            </a:schemeClr>
-          </a:lnRef>
-          <a:fillRef idx="1">
-            <a:schemeClr val="accent1"/>
-          </a:fillRef>
-          <a:effectRef idx="0">
-            <a:schemeClr val="accent1"/>
-          </a:effectRef>
-          <a:fontRef idx="minor">
-            <a:schemeClr val="lt1"/>
-          </a:fontRef>
-        </p:style>
-        <p:txBody>
-          <a:bodyPr rtlCol="0" anchor="ctr"/>
-          <a:lstStyle/>
-          <a:p>
-            <a:pPr algn="ctr"/>
-            <a:endParaRPr lang="es-AR"/>
-          </a:p>
-        </p:txBody>
-      </p:sp>
-      <p:sp>
-        <p:nvSpPr>
-          <p:cNvPr id="48" name="47 Rectángulo"/>
-          <p:cNvSpPr/>
-          <p:nvPr/>
-        </p:nvSpPr>
-        <p:spPr>
-          <a:xfrm>
-            <a:off x="6929454" y="1214422"/>
-            <a:ext cx="785818" cy="357190"/>
-          </a:xfrm>
-          <a:prstGeom prst="rect">
-            <a:avLst/>
-          </a:prstGeom>
-          <a:solidFill>
-            <a:schemeClr val="bg1"/>
-          </a:solidFill>
-          <a:ln>
-            <a:noFill/>
-          </a:ln>
-        </p:spPr>
-        <p:style>
-          <a:lnRef idx="2">
-            <a:schemeClr val="accent1">
-              <a:shade val="50000"/>
-            </a:schemeClr>
-          </a:lnRef>
-          <a:fillRef idx="1">
-            <a:schemeClr val="accent1"/>
-          </a:fillRef>
-          <a:effectRef idx="0">
-            <a:schemeClr val="accent1"/>
-          </a:effectRef>
-          <a:fontRef idx="minor">
-            <a:schemeClr val="lt1"/>
-          </a:fontRef>
-        </p:style>
-        <p:txBody>
-          <a:bodyPr rtlCol="0" anchor="ctr"/>
-          <a:lstStyle/>
-          <a:p>
-            <a:pPr algn="ctr"/>
-            <a:endParaRPr lang="es-AR"/>
-          </a:p>
-        </p:txBody>
-      </p:sp>
-      <p:pic>
-        <p:nvPicPr>
-          <p:cNvPr id="1035" name="Picture 11" descr="C:\Users\PC ACER\Dropbox\botinazul.png"/>
-          <p:cNvPicPr>
-            <a:picLocks noChangeAspect="1" noChangeArrowheads="1"/>
-          </p:cNvPicPr>
-          <p:nvPr/>
-        </p:nvPicPr>
-        <p:blipFill>
-          <a:blip r:embed="rId10" cstate="print"/>
-          <a:srcRect/>
-          <a:stretch>
-            <a:fillRect/>
-          </a:stretch>
-        </p:blipFill>
-        <p:spPr bwMode="auto">
-          <a:xfrm>
-            <a:off x="7143768" y="1214422"/>
-            <a:ext cx="357190" cy="357190"/>
-          </a:xfrm>
-          <a:prstGeom prst="rect">
-            <a:avLst/>
-          </a:prstGeom>
-          <a:noFill/>
-        </p:spPr>
-      </p:pic>
-      <p:sp>
-        <p:nvSpPr>
-          <p:cNvPr id="49" name="48 Rectángulo"/>
-          <p:cNvSpPr/>
-          <p:nvPr/>
-        </p:nvSpPr>
-        <p:spPr>
-          <a:xfrm>
-            <a:off x="6929454" y="3357562"/>
-            <a:ext cx="785818" cy="357190"/>
-          </a:xfrm>
-          <a:prstGeom prst="rect">
-            <a:avLst/>
-          </a:prstGeom>
-          <a:solidFill>
-            <a:schemeClr val="bg1"/>
-          </a:solidFill>
-          <a:ln>
-            <a:noFill/>
-          </a:ln>
-        </p:spPr>
-        <p:style>
-          <a:lnRef idx="2">
-            <a:schemeClr val="accent1">
-              <a:shade val="50000"/>
-            </a:schemeClr>
-          </a:lnRef>
-          <a:fillRef idx="1">
-            <a:schemeClr val="accent1"/>
-          </a:fillRef>
-          <a:effectRef idx="0">
-            <a:schemeClr val="accent1"/>
-          </a:effectRef>
-          <a:fontRef idx="minor">
-            <a:schemeClr val="lt1"/>
-          </a:fontRef>
-        </p:style>
-        <p:txBody>
-          <a:bodyPr rtlCol="0" anchor="ctr"/>
-          <a:lstStyle/>
-          <a:p>
-            <a:pPr algn="ctr"/>
-            <a:endParaRPr lang="es-AR"/>
-          </a:p>
-        </p:txBody>
-      </p:sp>
-      <p:sp>
-        <p:nvSpPr>
-          <p:cNvPr id="50" name="49 Rectángulo"/>
-          <p:cNvSpPr/>
-          <p:nvPr/>
-        </p:nvSpPr>
-        <p:spPr>
-          <a:xfrm>
-            <a:off x="6858016" y="5643578"/>
-            <a:ext cx="785818" cy="428628"/>
-          </a:xfrm>
-          <a:prstGeom prst="rect">
-            <a:avLst/>
-          </a:prstGeom>
-          <a:solidFill>
-            <a:schemeClr val="bg1"/>
-          </a:solidFill>
-          <a:ln>
-            <a:noFill/>
-          </a:ln>
-        </p:spPr>
-        <p:style>
-          <a:lnRef idx="2">
-            <a:schemeClr val="accent1">
-              <a:shade val="50000"/>
-            </a:schemeClr>
-          </a:lnRef>
-          <a:fillRef idx="1">
-            <a:schemeClr val="accent1"/>
-          </a:fillRef>
-          <a:effectRef idx="0">
-            <a:schemeClr val="accent1"/>
-          </a:effectRef>
-          <a:fontRef idx="minor">
-            <a:schemeClr val="lt1"/>
-          </a:fontRef>
-        </p:style>
-        <p:txBody>
-          <a:bodyPr rtlCol="0" anchor="ctr"/>
-          <a:lstStyle/>
-          <a:p>
-            <a:pPr algn="ctr"/>
-            <a:endParaRPr lang="es-AR"/>
-          </a:p>
-        </p:txBody>
-      </p:sp>
-      <p:pic>
-        <p:nvPicPr>
-          <p:cNvPr id="1036" name="Picture 12" descr="C:\Users\PC ACER\Dropbox\botinnegro.png"/>
-          <p:cNvPicPr>
-            <a:picLocks noChangeAspect="1" noChangeArrowheads="1"/>
-          </p:cNvPicPr>
-          <p:nvPr/>
-        </p:nvPicPr>
-        <p:blipFill>
-          <a:blip r:embed="rId11" cstate="print"/>
-          <a:srcRect/>
-          <a:stretch>
-            <a:fillRect/>
-          </a:stretch>
-        </p:blipFill>
-        <p:spPr bwMode="auto">
-          <a:xfrm>
-            <a:off x="7072330" y="5643578"/>
-            <a:ext cx="428628" cy="428628"/>
-          </a:xfrm>
-          <a:prstGeom prst="rect">
-            <a:avLst/>
-          </a:prstGeom>
-          <a:noFill/>
-        </p:spPr>
-      </p:pic>
-      <p:pic>
-        <p:nvPicPr>
-          <p:cNvPr id="1037" name="Picture 13" descr="C:\Users\PC ACER\Dropbox\remera.png"/>
-          <p:cNvPicPr>
-            <a:picLocks noChangeAspect="1" noChangeArrowheads="1"/>
-          </p:cNvPicPr>
-          <p:nvPr/>
-        </p:nvPicPr>
-        <p:blipFill>
-          <a:blip r:embed="rId12" cstate="print"/>
-          <a:srcRect/>
-          <a:stretch>
-            <a:fillRect/>
-          </a:stretch>
-        </p:blipFill>
-        <p:spPr bwMode="auto">
-          <a:xfrm>
-            <a:off x="7143768" y="3357562"/>
-            <a:ext cx="357190" cy="357190"/>
+          <a:xfrm flipH="1">
+            <a:off x="6572264" y="2143116"/>
+            <a:ext cx="1537912" cy="1643074"/>
           </a:xfrm>
           <a:prstGeom prst="rect">
             <a:avLst/>
@@ -8742,46 +7992,9 @@
           <a:chExt cx="0" cy="0"/>
         </a:xfrm>
       </p:grpSpPr>
-      <p:sp>
-        <p:nvSpPr>
-          <p:cNvPr id="9" name="8 Rectángulo"/>
-          <p:cNvSpPr/>
-          <p:nvPr/>
-        </p:nvSpPr>
-        <p:spPr>
-          <a:xfrm>
-            <a:off x="2714612" y="2786058"/>
-            <a:ext cx="3929090" cy="830997"/>
-          </a:xfrm>
-          <a:prstGeom prst="rect">
-            <a:avLst/>
-          </a:prstGeom>
-        </p:spPr>
-        <p:txBody>
-          <a:bodyPr wrap="square">
-            <a:spAutoFit/>
-          </a:bodyPr>
-          <a:lstStyle/>
-          <a:p>
-            <a:r>
-              <a:rPr lang="es-AR" sz="4800" dirty="0" smtClean="0">
-                <a:latin typeface="Verdana" pitchFamily="34" charset="0"/>
-                <a:ea typeface="Verdana" pitchFamily="34" charset="0"/>
-                <a:cs typeface="Verdana" pitchFamily="34" charset="0"/>
-              </a:rPr>
-              <a:t>Preguntas?</a:t>
-            </a:r>
-            <a:endParaRPr lang="es-AR" sz="4800" dirty="0" smtClean="0">
-              <a:latin typeface="Verdana" pitchFamily="34" charset="0"/>
-              <a:ea typeface="Verdana" pitchFamily="34" charset="0"/>
-              <a:cs typeface="Verdana" pitchFamily="34" charset="0"/>
-            </a:endParaRPr>
-          </a:p>
-        </p:txBody>
-      </p:sp>
       <p:pic>
         <p:nvPicPr>
-          <p:cNvPr id="10" name="Picture 2" descr="D:\ProyectoFinal\Proyecto final\Logo_OpticalMarketing\iso2.png"/>
+          <p:cNvPr id="3" name="Picture 2" descr="http://www.clker.com/cliparts/b/F/d/4/M/0/red-person-outline-hi.png"/>
           <p:cNvPicPr>
             <a:picLocks noChangeAspect="1" noChangeArrowheads="1"/>
           </p:cNvPicPr>
@@ -8796,8 +8009,8 @@
         </p:blipFill>
         <p:spPr bwMode="auto">
           <a:xfrm>
-            <a:off x="680624" y="2143116"/>
-            <a:ext cx="1605360" cy="1643074"/>
+            <a:off x="214282" y="857232"/>
+            <a:ext cx="830090" cy="785818"/>
           </a:xfrm>
           <a:prstGeom prst="rect">
             <a:avLst/>
@@ -8805,69 +8018,9 @@
           <a:noFill/>
         </p:spPr>
       </p:pic>
-      <p:sp>
-        <p:nvSpPr>
-          <p:cNvPr id="47106" name="AutoShape 2" descr="Imágenes integradas 1"/>
-          <p:cNvSpPr>
-            <a:spLocks noChangeAspect="1" noChangeArrowheads="1"/>
-          </p:cNvSpPr>
-          <p:nvPr/>
-        </p:nvSpPr>
-        <p:spPr bwMode="auto">
-          <a:xfrm>
-            <a:off x="155575" y="-144463"/>
-            <a:ext cx="304800" cy="304801"/>
-          </a:xfrm>
-          <a:prstGeom prst="rect">
-            <a:avLst/>
-          </a:prstGeom>
-          <a:noFill/>
-        </p:spPr>
-        <p:txBody>
-          <a:bodyPr vert="horz" wrap="square" lIns="91440" tIns="45720" rIns="91440" bIns="45720" numCol="1" anchor="t" anchorCtr="0" compatLnSpc="1">
-            <a:prstTxWarp prst="textNoShape">
-              <a:avLst/>
-            </a:prstTxWarp>
-          </a:bodyPr>
-          <a:lstStyle/>
-          <a:p>
-            <a:endParaRPr lang="es-AR"/>
-          </a:p>
-        </p:txBody>
-      </p:sp>
-      <p:sp>
-        <p:nvSpPr>
-          <p:cNvPr id="47108" name="AutoShape 4" descr="Imágenes integradas 1"/>
-          <p:cNvSpPr>
-            <a:spLocks noChangeAspect="1" noChangeArrowheads="1"/>
-          </p:cNvSpPr>
-          <p:nvPr/>
-        </p:nvSpPr>
-        <p:spPr bwMode="auto">
-          <a:xfrm>
-            <a:off x="155575" y="-144463"/>
-            <a:ext cx="304800" cy="304801"/>
-          </a:xfrm>
-          <a:prstGeom prst="rect">
-            <a:avLst/>
-          </a:prstGeom>
-          <a:noFill/>
-        </p:spPr>
-        <p:txBody>
-          <a:bodyPr vert="horz" wrap="square" lIns="91440" tIns="45720" rIns="91440" bIns="45720" numCol="1" anchor="t" anchorCtr="0" compatLnSpc="1">
-            <a:prstTxWarp prst="textNoShape">
-              <a:avLst/>
-            </a:prstTxWarp>
-          </a:bodyPr>
-          <a:lstStyle/>
-          <a:p>
-            <a:endParaRPr lang="es-AR"/>
-          </a:p>
-        </p:txBody>
-      </p:sp>
       <p:pic>
         <p:nvPicPr>
-          <p:cNvPr id="8" name="Picture 2" descr="D:\ProyectoFinal\Proyecto final\Logo_OpticalMarketing\iso2.png"/>
+          <p:cNvPr id="9" name="Picture 2" descr="http://www.clker.com/cliparts/b/F/d/4/M/0/red-person-outline-hi.png"/>
           <p:cNvPicPr>
             <a:picLocks noChangeAspect="1" noChangeArrowheads="1"/>
           </p:cNvPicPr>
@@ -8881,9 +8034,1208 @@
           </a:stretch>
         </p:blipFill>
         <p:spPr bwMode="auto">
-          <a:xfrm flipH="1">
-            <a:off x="6572264" y="2143116"/>
-            <a:ext cx="1537912" cy="1643074"/>
+          <a:xfrm>
+            <a:off x="142844" y="5214950"/>
+            <a:ext cx="830090" cy="785818"/>
+          </a:xfrm>
+          <a:prstGeom prst="rect">
+            <a:avLst/>
+          </a:prstGeom>
+          <a:noFill/>
+        </p:spPr>
+      </p:pic>
+      <p:cxnSp>
+        <p:nvCxnSpPr>
+          <p:cNvPr id="13" name="12 Conector recto"/>
+          <p:cNvCxnSpPr>
+            <a:stCxn id="9" idx="3"/>
+            <a:endCxn id="9" idx="3"/>
+          </p:cNvCxnSpPr>
+          <p:nvPr/>
+        </p:nvCxnSpPr>
+        <p:spPr>
+          <a:xfrm>
+            <a:off x="972934" y="5607859"/>
+            <a:ext cx="1588" cy="1588"/>
+          </a:xfrm>
+          <a:prstGeom prst="line">
+            <a:avLst/>
+          </a:prstGeom>
+        </p:spPr>
+        <p:style>
+          <a:lnRef idx="1">
+            <a:schemeClr val="accent1"/>
+          </a:lnRef>
+          <a:fillRef idx="0">
+            <a:schemeClr val="accent1"/>
+          </a:fillRef>
+          <a:effectRef idx="0">
+            <a:schemeClr val="accent1"/>
+          </a:effectRef>
+          <a:fontRef idx="minor">
+            <a:schemeClr val="tx1"/>
+          </a:fontRef>
+        </p:style>
+      </p:cxnSp>
+      <p:pic>
+        <p:nvPicPr>
+          <p:cNvPr id="1026" name="Picture 2" descr="D:\ProyectoFinal\Proyecto final\Logo_OpticalMarketing\iso2.png"/>
+          <p:cNvPicPr>
+            <a:picLocks noChangeAspect="1" noChangeArrowheads="1"/>
+          </p:cNvPicPr>
+          <p:nvPr/>
+        </p:nvPicPr>
+        <p:blipFill>
+          <a:blip r:embed="rId4" cstate="print"/>
+          <a:srcRect/>
+          <a:stretch>
+            <a:fillRect/>
+          </a:stretch>
+        </p:blipFill>
+        <p:spPr bwMode="auto">
+          <a:xfrm>
+            <a:off x="3929058" y="2643182"/>
+            <a:ext cx="1071569" cy="1096743"/>
+          </a:xfrm>
+          <a:prstGeom prst="rect">
+            <a:avLst/>
+          </a:prstGeom>
+          <a:noFill/>
+        </p:spPr>
+      </p:pic>
+      <p:pic>
+        <p:nvPicPr>
+          <p:cNvPr id="18" name="Picture 5" descr="https://si0.twimg.com/profile_images/97538866/UniPersonLogoGS_red.gif"/>
+          <p:cNvPicPr>
+            <a:picLocks noChangeAspect="1" noChangeArrowheads="1"/>
+          </p:cNvPicPr>
+          <p:nvPr/>
+        </p:nvPicPr>
+        <p:blipFill>
+          <a:blip r:embed="rId5"/>
+          <a:srcRect/>
+          <a:stretch>
+            <a:fillRect/>
+          </a:stretch>
+        </p:blipFill>
+        <p:spPr bwMode="auto">
+          <a:xfrm>
+            <a:off x="8224656" y="5429264"/>
+            <a:ext cx="776500" cy="857256"/>
+          </a:xfrm>
+          <a:prstGeom prst="rect">
+            <a:avLst/>
+          </a:prstGeom>
+          <a:noFill/>
+        </p:spPr>
+      </p:pic>
+      <p:pic>
+        <p:nvPicPr>
+          <p:cNvPr id="1027" name="Picture 3" descr="C:\Users\PC ACER\Dropbox\OpticalMarketing\images\LED-TV.jpg"/>
+          <p:cNvPicPr>
+            <a:picLocks noChangeAspect="1" noChangeArrowheads="1"/>
+          </p:cNvPicPr>
+          <p:nvPr/>
+        </p:nvPicPr>
+        <p:blipFill>
+          <a:blip r:embed="rId6" cstate="print"/>
+          <a:srcRect/>
+          <a:stretch>
+            <a:fillRect/>
+          </a:stretch>
+        </p:blipFill>
+        <p:spPr bwMode="auto">
+          <a:xfrm>
+            <a:off x="6786578" y="5457397"/>
+            <a:ext cx="928694" cy="829123"/>
+          </a:xfrm>
+          <a:prstGeom prst="rect">
+            <a:avLst/>
+          </a:prstGeom>
+          <a:noFill/>
+        </p:spPr>
+      </p:pic>
+      <p:pic>
+        <p:nvPicPr>
+          <p:cNvPr id="20" name="Picture 5" descr="https://si0.twimg.com/profile_images/97538866/UniPersonLogoGS_red.gif"/>
+          <p:cNvPicPr>
+            <a:picLocks noChangeAspect="1" noChangeArrowheads="1"/>
+          </p:cNvPicPr>
+          <p:nvPr/>
+        </p:nvPicPr>
+        <p:blipFill>
+          <a:blip r:embed="rId5"/>
+          <a:srcRect/>
+          <a:stretch>
+            <a:fillRect/>
+          </a:stretch>
+        </p:blipFill>
+        <p:spPr bwMode="auto">
+          <a:xfrm>
+            <a:off x="8296094" y="3071810"/>
+            <a:ext cx="776500" cy="857256"/>
+          </a:xfrm>
+          <a:prstGeom prst="rect">
+            <a:avLst/>
+          </a:prstGeom>
+          <a:noFill/>
+        </p:spPr>
+      </p:pic>
+      <p:pic>
+        <p:nvPicPr>
+          <p:cNvPr id="21" name="Picture 5" descr="https://si0.twimg.com/profile_images/97538866/UniPersonLogoGS_red.gif"/>
+          <p:cNvPicPr>
+            <a:picLocks noChangeAspect="1" noChangeArrowheads="1"/>
+          </p:cNvPicPr>
+          <p:nvPr/>
+        </p:nvPicPr>
+        <p:blipFill>
+          <a:blip r:embed="rId5"/>
+          <a:srcRect/>
+          <a:stretch>
+            <a:fillRect/>
+          </a:stretch>
+        </p:blipFill>
+        <p:spPr bwMode="auto">
+          <a:xfrm>
+            <a:off x="8296094" y="928670"/>
+            <a:ext cx="776500" cy="857256"/>
+          </a:xfrm>
+          <a:prstGeom prst="rect">
+            <a:avLst/>
+          </a:prstGeom>
+          <a:noFill/>
+        </p:spPr>
+      </p:pic>
+      <p:pic>
+        <p:nvPicPr>
+          <p:cNvPr id="22" name="Picture 3" descr="C:\Users\PC ACER\Dropbox\OpticalMarketing\images\LED-TV.jpg"/>
+          <p:cNvPicPr>
+            <a:picLocks noChangeAspect="1" noChangeArrowheads="1"/>
+          </p:cNvPicPr>
+          <p:nvPr/>
+        </p:nvPicPr>
+        <p:blipFill>
+          <a:blip r:embed="rId6" cstate="print"/>
+          <a:srcRect/>
+          <a:stretch>
+            <a:fillRect/>
+          </a:stretch>
+        </p:blipFill>
+        <p:spPr bwMode="auto">
+          <a:xfrm>
+            <a:off x="6858016" y="3143248"/>
+            <a:ext cx="928694" cy="829123"/>
+          </a:xfrm>
+          <a:prstGeom prst="rect">
+            <a:avLst/>
+          </a:prstGeom>
+          <a:noFill/>
+        </p:spPr>
+      </p:pic>
+      <p:pic>
+        <p:nvPicPr>
+          <p:cNvPr id="23" name="Picture 3" descr="C:\Users\PC ACER\Dropbox\OpticalMarketing\images\LED-TV.jpg"/>
+          <p:cNvPicPr>
+            <a:picLocks noChangeAspect="1" noChangeArrowheads="1"/>
+          </p:cNvPicPr>
+          <p:nvPr/>
+        </p:nvPicPr>
+        <p:blipFill>
+          <a:blip r:embed="rId6" cstate="print"/>
+          <a:srcRect/>
+          <a:stretch>
+            <a:fillRect/>
+          </a:stretch>
+        </p:blipFill>
+        <p:spPr bwMode="auto">
+          <a:xfrm>
+            <a:off x="6858016" y="1000108"/>
+            <a:ext cx="928694" cy="829123"/>
+          </a:xfrm>
+          <a:prstGeom prst="rect">
+            <a:avLst/>
+          </a:prstGeom>
+          <a:noFill/>
+        </p:spPr>
+      </p:pic>
+      <p:pic>
+        <p:nvPicPr>
+          <p:cNvPr id="1028" name="Picture 4" descr="C:\Users\PC ACER\Dropbox\OpticalMarketing\images\kinect-20100613095509272-1024x640 (1).jpg"/>
+          <p:cNvPicPr>
+            <a:picLocks noChangeAspect="1" noChangeArrowheads="1"/>
+          </p:cNvPicPr>
+          <p:nvPr/>
+        </p:nvPicPr>
+        <p:blipFill>
+          <a:blip r:embed="rId7" cstate="print"/>
+          <a:srcRect/>
+          <a:stretch>
+            <a:fillRect/>
+          </a:stretch>
+        </p:blipFill>
+        <p:spPr bwMode="auto">
+          <a:xfrm>
+            <a:off x="6715140" y="5129624"/>
+            <a:ext cx="1095350" cy="371078"/>
+          </a:xfrm>
+          <a:prstGeom prst="rect">
+            <a:avLst/>
+          </a:prstGeom>
+          <a:noFill/>
+        </p:spPr>
+      </p:pic>
+      <p:pic>
+        <p:nvPicPr>
+          <p:cNvPr id="25" name="Picture 4" descr="C:\Users\PC ACER\Dropbox\OpticalMarketing\images\kinect-20100613095509272-1024x640 (1).jpg"/>
+          <p:cNvPicPr>
+            <a:picLocks noChangeAspect="1" noChangeArrowheads="1"/>
+          </p:cNvPicPr>
+          <p:nvPr/>
+        </p:nvPicPr>
+        <p:blipFill>
+          <a:blip r:embed="rId7" cstate="print"/>
+          <a:srcRect/>
+          <a:stretch>
+            <a:fillRect/>
+          </a:stretch>
+        </p:blipFill>
+        <p:spPr bwMode="auto">
+          <a:xfrm>
+            <a:off x="6786578" y="2786058"/>
+            <a:ext cx="1095350" cy="371078"/>
+          </a:xfrm>
+          <a:prstGeom prst="rect">
+            <a:avLst/>
+          </a:prstGeom>
+          <a:noFill/>
+        </p:spPr>
+      </p:pic>
+      <p:pic>
+        <p:nvPicPr>
+          <p:cNvPr id="26" name="Picture 4" descr="C:\Users\PC ACER\Dropbox\OpticalMarketing\images\kinect-20100613095509272-1024x640 (1).jpg"/>
+          <p:cNvPicPr>
+            <a:picLocks noChangeAspect="1" noChangeArrowheads="1"/>
+          </p:cNvPicPr>
+          <p:nvPr/>
+        </p:nvPicPr>
+        <p:blipFill>
+          <a:blip r:embed="rId7" cstate="print"/>
+          <a:srcRect/>
+          <a:stretch>
+            <a:fillRect/>
+          </a:stretch>
+        </p:blipFill>
+        <p:spPr bwMode="auto">
+          <a:xfrm>
+            <a:off x="6762798" y="700468"/>
+            <a:ext cx="1095350" cy="371078"/>
+          </a:xfrm>
+          <a:prstGeom prst="rect">
+            <a:avLst/>
+          </a:prstGeom>
+          <a:noFill/>
+        </p:spPr>
+      </p:pic>
+      <p:sp>
+        <p:nvSpPr>
+          <p:cNvPr id="1030" name="AutoShape 6" descr="Imágenes integradas 1"/>
+          <p:cNvSpPr>
+            <a:spLocks noChangeAspect="1" noChangeArrowheads="1"/>
+          </p:cNvSpPr>
+          <p:nvPr/>
+        </p:nvSpPr>
+        <p:spPr bwMode="auto">
+          <a:xfrm>
+            <a:off x="155575" y="-144463"/>
+            <a:ext cx="304800" cy="304801"/>
+          </a:xfrm>
+          <a:prstGeom prst="rect">
+            <a:avLst/>
+          </a:prstGeom>
+          <a:noFill/>
+        </p:spPr>
+        <p:txBody>
+          <a:bodyPr vert="horz" wrap="square" lIns="91440" tIns="45720" rIns="91440" bIns="45720" numCol="1" anchor="t" anchorCtr="0" compatLnSpc="1">
+            <a:prstTxWarp prst="textNoShape">
+              <a:avLst/>
+            </a:prstTxWarp>
+          </a:bodyPr>
+          <a:lstStyle/>
+          <a:p>
+            <a:endParaRPr lang="es-AR"/>
+          </a:p>
+        </p:txBody>
+      </p:sp>
+      <p:sp>
+        <p:nvSpPr>
+          <p:cNvPr id="1032" name="AutoShape 8" descr="Imágenes integradas 1"/>
+          <p:cNvSpPr>
+            <a:spLocks noChangeAspect="1" noChangeArrowheads="1"/>
+          </p:cNvSpPr>
+          <p:nvPr/>
+        </p:nvSpPr>
+        <p:spPr bwMode="auto">
+          <a:xfrm>
+            <a:off x="155575" y="-144463"/>
+            <a:ext cx="304800" cy="304801"/>
+          </a:xfrm>
+          <a:prstGeom prst="rect">
+            <a:avLst/>
+          </a:prstGeom>
+          <a:noFill/>
+        </p:spPr>
+        <p:txBody>
+          <a:bodyPr vert="horz" wrap="square" lIns="91440" tIns="45720" rIns="91440" bIns="45720" numCol="1" anchor="t" anchorCtr="0" compatLnSpc="1">
+            <a:prstTxWarp prst="textNoShape">
+              <a:avLst/>
+            </a:prstTxWarp>
+          </a:bodyPr>
+          <a:lstStyle/>
+          <a:p>
+            <a:endParaRPr lang="es-AR"/>
+          </a:p>
+        </p:txBody>
+      </p:sp>
+      <p:pic>
+        <p:nvPicPr>
+          <p:cNvPr id="1033" name="Picture 9"/>
+          <p:cNvPicPr>
+            <a:picLocks noChangeAspect="1" noChangeArrowheads="1"/>
+          </p:cNvPicPr>
+          <p:nvPr/>
+        </p:nvPicPr>
+        <p:blipFill>
+          <a:blip r:embed="rId8" cstate="print"/>
+          <a:srcRect/>
+          <a:stretch>
+            <a:fillRect/>
+          </a:stretch>
+        </p:blipFill>
+        <p:spPr bwMode="auto">
+          <a:xfrm>
+            <a:off x="1500166" y="4929198"/>
+            <a:ext cx="1749432" cy="1571612"/>
+          </a:xfrm>
+          <a:prstGeom prst="rect">
+            <a:avLst/>
+          </a:prstGeom>
+          <a:noFill/>
+          <a:ln w="9525">
+            <a:noFill/>
+            <a:miter lim="800000"/>
+            <a:headEnd/>
+            <a:tailEnd/>
+          </a:ln>
+          <a:effectLst/>
+        </p:spPr>
+      </p:pic>
+      <p:pic>
+        <p:nvPicPr>
+          <p:cNvPr id="30" name="Picture 9"/>
+          <p:cNvPicPr>
+            <a:picLocks noChangeAspect="1" noChangeArrowheads="1"/>
+          </p:cNvPicPr>
+          <p:nvPr/>
+        </p:nvPicPr>
+        <p:blipFill>
+          <a:blip r:embed="rId8" cstate="print"/>
+          <a:srcRect/>
+          <a:stretch>
+            <a:fillRect/>
+          </a:stretch>
+        </p:blipFill>
+        <p:spPr bwMode="auto">
+          <a:xfrm>
+            <a:off x="1643042" y="500042"/>
+            <a:ext cx="1749432" cy="1571612"/>
+          </a:xfrm>
+          <a:prstGeom prst="rect">
+            <a:avLst/>
+          </a:prstGeom>
+          <a:noFill/>
+          <a:ln w="9525">
+            <a:noFill/>
+            <a:miter lim="800000"/>
+            <a:headEnd/>
+            <a:tailEnd/>
+          </a:ln>
+          <a:effectLst/>
+        </p:spPr>
+      </p:pic>
+      <p:sp>
+        <p:nvSpPr>
+          <p:cNvPr id="32" name="31 Rectángulo"/>
+          <p:cNvSpPr/>
+          <p:nvPr/>
+        </p:nvSpPr>
+        <p:spPr>
+          <a:xfrm>
+            <a:off x="1643042" y="500042"/>
+            <a:ext cx="1785950" cy="1571636"/>
+          </a:xfrm>
+          <a:prstGeom prst="rect">
+            <a:avLst/>
+          </a:prstGeom>
+          <a:noFill/>
+          <a:ln>
+            <a:solidFill>
+              <a:schemeClr val="tx1"/>
+            </a:solidFill>
+          </a:ln>
+        </p:spPr>
+        <p:style>
+          <a:lnRef idx="2">
+            <a:schemeClr val="accent1">
+              <a:shade val="50000"/>
+            </a:schemeClr>
+          </a:lnRef>
+          <a:fillRef idx="1">
+            <a:schemeClr val="accent1"/>
+          </a:fillRef>
+          <a:effectRef idx="0">
+            <a:schemeClr val="accent1"/>
+          </a:effectRef>
+          <a:fontRef idx="minor">
+            <a:schemeClr val="lt1"/>
+          </a:fontRef>
+        </p:style>
+        <p:txBody>
+          <a:bodyPr rtlCol="0" anchor="ctr"/>
+          <a:lstStyle/>
+          <a:p>
+            <a:pPr algn="ctr"/>
+            <a:endParaRPr lang="es-AR"/>
+          </a:p>
+        </p:txBody>
+      </p:sp>
+      <p:sp>
+        <p:nvSpPr>
+          <p:cNvPr id="34" name="33 Rectángulo"/>
+          <p:cNvSpPr/>
+          <p:nvPr/>
+        </p:nvSpPr>
+        <p:spPr>
+          <a:xfrm>
+            <a:off x="1500166" y="4929198"/>
+            <a:ext cx="1785950" cy="1571636"/>
+          </a:xfrm>
+          <a:prstGeom prst="rect">
+            <a:avLst/>
+          </a:prstGeom>
+          <a:noFill/>
+          <a:ln>
+            <a:solidFill>
+              <a:schemeClr val="tx1"/>
+            </a:solidFill>
+          </a:ln>
+        </p:spPr>
+        <p:style>
+          <a:lnRef idx="2">
+            <a:schemeClr val="accent1">
+              <a:shade val="50000"/>
+            </a:schemeClr>
+          </a:lnRef>
+          <a:fillRef idx="1">
+            <a:schemeClr val="accent1"/>
+          </a:fillRef>
+          <a:effectRef idx="0">
+            <a:schemeClr val="accent1"/>
+          </a:effectRef>
+          <a:fontRef idx="minor">
+            <a:schemeClr val="lt1"/>
+          </a:fontRef>
+        </p:style>
+        <p:txBody>
+          <a:bodyPr rtlCol="0" anchor="ctr"/>
+          <a:lstStyle/>
+          <a:p>
+            <a:pPr algn="ctr"/>
+            <a:endParaRPr lang="es-AR"/>
+          </a:p>
+        </p:txBody>
+      </p:sp>
+      <p:sp>
+        <p:nvSpPr>
+          <p:cNvPr id="35" name="34 Flecha izquierda y derecha"/>
+          <p:cNvSpPr/>
+          <p:nvPr/>
+        </p:nvSpPr>
+        <p:spPr>
+          <a:xfrm>
+            <a:off x="1000100" y="1071546"/>
+            <a:ext cx="571504" cy="214314"/>
+          </a:xfrm>
+          <a:prstGeom prst="leftRightArrow">
+            <a:avLst/>
+          </a:prstGeom>
+        </p:spPr>
+        <p:style>
+          <a:lnRef idx="2">
+            <a:schemeClr val="accent1">
+              <a:shade val="50000"/>
+            </a:schemeClr>
+          </a:lnRef>
+          <a:fillRef idx="1">
+            <a:schemeClr val="accent1"/>
+          </a:fillRef>
+          <a:effectRef idx="0">
+            <a:schemeClr val="accent1"/>
+          </a:effectRef>
+          <a:fontRef idx="minor">
+            <a:schemeClr val="lt1"/>
+          </a:fontRef>
+        </p:style>
+        <p:txBody>
+          <a:bodyPr rtlCol="0" anchor="ctr"/>
+          <a:lstStyle/>
+          <a:p>
+            <a:pPr algn="ctr"/>
+            <a:endParaRPr lang="es-AR"/>
+          </a:p>
+        </p:txBody>
+      </p:sp>
+      <p:sp>
+        <p:nvSpPr>
+          <p:cNvPr id="36" name="35 Flecha izquierda y derecha"/>
+          <p:cNvSpPr/>
+          <p:nvPr/>
+        </p:nvSpPr>
+        <p:spPr>
+          <a:xfrm>
+            <a:off x="857224" y="5429264"/>
+            <a:ext cx="571504" cy="214314"/>
+          </a:xfrm>
+          <a:prstGeom prst="leftRightArrow">
+            <a:avLst/>
+          </a:prstGeom>
+        </p:spPr>
+        <p:style>
+          <a:lnRef idx="2">
+            <a:schemeClr val="accent1">
+              <a:shade val="50000"/>
+            </a:schemeClr>
+          </a:lnRef>
+          <a:fillRef idx="1">
+            <a:schemeClr val="accent1"/>
+          </a:fillRef>
+          <a:effectRef idx="0">
+            <a:schemeClr val="accent1"/>
+          </a:effectRef>
+          <a:fontRef idx="minor">
+            <a:schemeClr val="lt1"/>
+          </a:fontRef>
+        </p:style>
+        <p:txBody>
+          <a:bodyPr rtlCol="0" anchor="ctr"/>
+          <a:lstStyle/>
+          <a:p>
+            <a:pPr algn="ctr"/>
+            <a:endParaRPr lang="es-AR"/>
+          </a:p>
+        </p:txBody>
+      </p:sp>
+      <p:pic>
+        <p:nvPicPr>
+          <p:cNvPr id="1034" name="Picture 10" descr="D:\ProyectoFinal\Proyecto final\Logo_OpticalMarketing\gris.png"/>
+          <p:cNvPicPr>
+            <a:picLocks noChangeAspect="1" noChangeArrowheads="1"/>
+          </p:cNvPicPr>
+          <p:nvPr/>
+        </p:nvPicPr>
+        <p:blipFill>
+          <a:blip r:embed="rId9" cstate="print"/>
+          <a:srcRect/>
+          <a:stretch>
+            <a:fillRect/>
+          </a:stretch>
+        </p:blipFill>
+        <p:spPr bwMode="auto">
+          <a:xfrm>
+            <a:off x="3643306" y="3786190"/>
+            <a:ext cx="1857388" cy="410631"/>
+          </a:xfrm>
+          <a:prstGeom prst="rect">
+            <a:avLst/>
+          </a:prstGeom>
+          <a:noFill/>
+        </p:spPr>
+      </p:pic>
+      <p:sp>
+        <p:nvSpPr>
+          <p:cNvPr id="38" name="37 Elipse"/>
+          <p:cNvSpPr/>
+          <p:nvPr/>
+        </p:nvSpPr>
+        <p:spPr>
+          <a:xfrm>
+            <a:off x="3500430" y="2500306"/>
+            <a:ext cx="2143140" cy="2143140"/>
+          </a:xfrm>
+          <a:prstGeom prst="ellipse">
+            <a:avLst/>
+          </a:prstGeom>
+          <a:noFill/>
+          <a:ln w="50800">
+            <a:solidFill>
+              <a:srgbClr val="FF0000"/>
+            </a:solidFill>
+          </a:ln>
+        </p:spPr>
+        <p:style>
+          <a:lnRef idx="2">
+            <a:schemeClr val="accent1">
+              <a:shade val="50000"/>
+            </a:schemeClr>
+          </a:lnRef>
+          <a:fillRef idx="1">
+            <a:schemeClr val="accent1"/>
+          </a:fillRef>
+          <a:effectRef idx="0">
+            <a:schemeClr val="accent1"/>
+          </a:effectRef>
+          <a:fontRef idx="minor">
+            <a:schemeClr val="lt1"/>
+          </a:fontRef>
+        </p:style>
+        <p:txBody>
+          <a:bodyPr rtlCol="0" anchor="ctr"/>
+          <a:lstStyle/>
+          <a:p>
+            <a:pPr algn="ctr"/>
+            <a:endParaRPr lang="es-AR"/>
+          </a:p>
+        </p:txBody>
+      </p:sp>
+      <p:sp>
+        <p:nvSpPr>
+          <p:cNvPr id="39" name="38 Flecha izquierda y derecha"/>
+          <p:cNvSpPr/>
+          <p:nvPr/>
+        </p:nvSpPr>
+        <p:spPr>
+          <a:xfrm rot="3119671">
+            <a:off x="3097900" y="2405508"/>
+            <a:ext cx="758991" cy="190664"/>
+          </a:xfrm>
+          <a:prstGeom prst="leftRightArrow">
+            <a:avLst/>
+          </a:prstGeom>
+        </p:spPr>
+        <p:style>
+          <a:lnRef idx="2">
+            <a:schemeClr val="accent1">
+              <a:shade val="50000"/>
+            </a:schemeClr>
+          </a:lnRef>
+          <a:fillRef idx="1">
+            <a:schemeClr val="accent1"/>
+          </a:fillRef>
+          <a:effectRef idx="0">
+            <a:schemeClr val="accent1"/>
+          </a:effectRef>
+          <a:fontRef idx="minor">
+            <a:schemeClr val="lt1"/>
+          </a:fontRef>
+        </p:style>
+        <p:txBody>
+          <a:bodyPr rtlCol="0" anchor="ctr"/>
+          <a:lstStyle/>
+          <a:p>
+            <a:pPr algn="ctr"/>
+            <a:endParaRPr lang="es-AR"/>
+          </a:p>
+        </p:txBody>
+      </p:sp>
+      <p:sp>
+        <p:nvSpPr>
+          <p:cNvPr id="40" name="39 Flecha izquierda y derecha"/>
+          <p:cNvSpPr/>
+          <p:nvPr/>
+        </p:nvSpPr>
+        <p:spPr>
+          <a:xfrm rot="19280318">
+            <a:off x="3048192" y="4502441"/>
+            <a:ext cx="758991" cy="190664"/>
+          </a:xfrm>
+          <a:prstGeom prst="leftRightArrow">
+            <a:avLst/>
+          </a:prstGeom>
+        </p:spPr>
+        <p:style>
+          <a:lnRef idx="2">
+            <a:schemeClr val="accent1">
+              <a:shade val="50000"/>
+            </a:schemeClr>
+          </a:lnRef>
+          <a:fillRef idx="1">
+            <a:schemeClr val="accent1"/>
+          </a:fillRef>
+          <a:effectRef idx="0">
+            <a:schemeClr val="accent1"/>
+          </a:effectRef>
+          <a:fontRef idx="minor">
+            <a:schemeClr val="lt1"/>
+          </a:fontRef>
+        </p:style>
+        <p:txBody>
+          <a:bodyPr rtlCol="0" anchor="ctr"/>
+          <a:lstStyle/>
+          <a:p>
+            <a:pPr algn="ctr"/>
+            <a:endParaRPr lang="es-AR"/>
+          </a:p>
+        </p:txBody>
+      </p:sp>
+      <p:sp>
+        <p:nvSpPr>
+          <p:cNvPr id="41" name="40 Flecha izquierda y derecha"/>
+          <p:cNvSpPr/>
+          <p:nvPr/>
+        </p:nvSpPr>
+        <p:spPr>
+          <a:xfrm>
+            <a:off x="5857884" y="3500438"/>
+            <a:ext cx="758991" cy="190664"/>
+          </a:xfrm>
+          <a:prstGeom prst="leftRightArrow">
+            <a:avLst/>
+          </a:prstGeom>
+        </p:spPr>
+        <p:style>
+          <a:lnRef idx="2">
+            <a:schemeClr val="accent1">
+              <a:shade val="50000"/>
+            </a:schemeClr>
+          </a:lnRef>
+          <a:fillRef idx="1">
+            <a:schemeClr val="accent1"/>
+          </a:fillRef>
+          <a:effectRef idx="0">
+            <a:schemeClr val="accent1"/>
+          </a:effectRef>
+          <a:fontRef idx="minor">
+            <a:schemeClr val="lt1"/>
+          </a:fontRef>
+        </p:style>
+        <p:txBody>
+          <a:bodyPr rtlCol="0" anchor="ctr"/>
+          <a:lstStyle/>
+          <a:p>
+            <a:pPr algn="ctr"/>
+            <a:endParaRPr lang="es-AR"/>
+          </a:p>
+        </p:txBody>
+      </p:sp>
+      <p:sp>
+        <p:nvSpPr>
+          <p:cNvPr id="42" name="41 Flecha izquierda y derecha"/>
+          <p:cNvSpPr/>
+          <p:nvPr/>
+        </p:nvSpPr>
+        <p:spPr>
+          <a:xfrm rot="19280318">
+            <a:off x="5290055" y="2042724"/>
+            <a:ext cx="1349972" cy="200784"/>
+          </a:xfrm>
+          <a:prstGeom prst="leftRightArrow">
+            <a:avLst/>
+          </a:prstGeom>
+        </p:spPr>
+        <p:style>
+          <a:lnRef idx="2">
+            <a:schemeClr val="accent1">
+              <a:shade val="50000"/>
+            </a:schemeClr>
+          </a:lnRef>
+          <a:fillRef idx="1">
+            <a:schemeClr val="accent1"/>
+          </a:fillRef>
+          <a:effectRef idx="0">
+            <a:schemeClr val="accent1"/>
+          </a:effectRef>
+          <a:fontRef idx="minor">
+            <a:schemeClr val="lt1"/>
+          </a:fontRef>
+        </p:style>
+        <p:txBody>
+          <a:bodyPr rtlCol="0" anchor="ctr"/>
+          <a:lstStyle/>
+          <a:p>
+            <a:pPr algn="ctr"/>
+            <a:endParaRPr lang="es-AR"/>
+          </a:p>
+        </p:txBody>
+      </p:sp>
+      <p:sp>
+        <p:nvSpPr>
+          <p:cNvPr id="43" name="42 Flecha izquierda y derecha"/>
+          <p:cNvSpPr/>
+          <p:nvPr/>
+        </p:nvSpPr>
+        <p:spPr>
+          <a:xfrm rot="2539898">
+            <a:off x="5177989" y="4928944"/>
+            <a:ext cx="1349972" cy="200784"/>
+          </a:xfrm>
+          <a:prstGeom prst="leftRightArrow">
+            <a:avLst/>
+          </a:prstGeom>
+        </p:spPr>
+        <p:style>
+          <a:lnRef idx="2">
+            <a:schemeClr val="accent1">
+              <a:shade val="50000"/>
+            </a:schemeClr>
+          </a:lnRef>
+          <a:fillRef idx="1">
+            <a:schemeClr val="accent1"/>
+          </a:fillRef>
+          <a:effectRef idx="0">
+            <a:schemeClr val="accent1"/>
+          </a:effectRef>
+          <a:fontRef idx="minor">
+            <a:schemeClr val="lt1"/>
+          </a:fontRef>
+        </p:style>
+        <p:txBody>
+          <a:bodyPr rtlCol="0" anchor="ctr"/>
+          <a:lstStyle/>
+          <a:p>
+            <a:pPr algn="ctr"/>
+            <a:endParaRPr lang="es-AR"/>
+          </a:p>
+        </p:txBody>
+      </p:sp>
+      <p:sp>
+        <p:nvSpPr>
+          <p:cNvPr id="44" name="43 Flecha izquierda y derecha"/>
+          <p:cNvSpPr/>
+          <p:nvPr/>
+        </p:nvSpPr>
+        <p:spPr>
+          <a:xfrm>
+            <a:off x="7858148" y="1428736"/>
+            <a:ext cx="571504" cy="214314"/>
+          </a:xfrm>
+          <a:prstGeom prst="leftRightArrow">
+            <a:avLst/>
+          </a:prstGeom>
+        </p:spPr>
+        <p:style>
+          <a:lnRef idx="2">
+            <a:schemeClr val="accent1">
+              <a:shade val="50000"/>
+            </a:schemeClr>
+          </a:lnRef>
+          <a:fillRef idx="1">
+            <a:schemeClr val="accent1"/>
+          </a:fillRef>
+          <a:effectRef idx="0">
+            <a:schemeClr val="accent1"/>
+          </a:effectRef>
+          <a:fontRef idx="minor">
+            <a:schemeClr val="lt1"/>
+          </a:fontRef>
+        </p:style>
+        <p:txBody>
+          <a:bodyPr rtlCol="0" anchor="ctr"/>
+          <a:lstStyle/>
+          <a:p>
+            <a:pPr algn="ctr"/>
+            <a:endParaRPr lang="es-AR"/>
+          </a:p>
+        </p:txBody>
+      </p:sp>
+      <p:sp>
+        <p:nvSpPr>
+          <p:cNvPr id="45" name="44 Flecha izquierda y derecha"/>
+          <p:cNvSpPr/>
+          <p:nvPr/>
+        </p:nvSpPr>
+        <p:spPr>
+          <a:xfrm>
+            <a:off x="7858148" y="3500438"/>
+            <a:ext cx="571504" cy="214314"/>
+          </a:xfrm>
+          <a:prstGeom prst="leftRightArrow">
+            <a:avLst/>
+          </a:prstGeom>
+        </p:spPr>
+        <p:style>
+          <a:lnRef idx="2">
+            <a:schemeClr val="accent1">
+              <a:shade val="50000"/>
+            </a:schemeClr>
+          </a:lnRef>
+          <a:fillRef idx="1">
+            <a:schemeClr val="accent1"/>
+          </a:fillRef>
+          <a:effectRef idx="0">
+            <a:schemeClr val="accent1"/>
+          </a:effectRef>
+          <a:fontRef idx="minor">
+            <a:schemeClr val="lt1"/>
+          </a:fontRef>
+        </p:style>
+        <p:txBody>
+          <a:bodyPr rtlCol="0" anchor="ctr"/>
+          <a:lstStyle/>
+          <a:p>
+            <a:pPr algn="ctr"/>
+            <a:endParaRPr lang="es-AR"/>
+          </a:p>
+        </p:txBody>
+      </p:sp>
+      <p:sp>
+        <p:nvSpPr>
+          <p:cNvPr id="46" name="45 Flecha izquierda y derecha"/>
+          <p:cNvSpPr/>
+          <p:nvPr/>
+        </p:nvSpPr>
+        <p:spPr>
+          <a:xfrm>
+            <a:off x="7858148" y="5929330"/>
+            <a:ext cx="571504" cy="214314"/>
+          </a:xfrm>
+          <a:prstGeom prst="leftRightArrow">
+            <a:avLst/>
+          </a:prstGeom>
+        </p:spPr>
+        <p:style>
+          <a:lnRef idx="2">
+            <a:schemeClr val="accent1">
+              <a:shade val="50000"/>
+            </a:schemeClr>
+          </a:lnRef>
+          <a:fillRef idx="1">
+            <a:schemeClr val="accent1"/>
+          </a:fillRef>
+          <a:effectRef idx="0">
+            <a:schemeClr val="accent1"/>
+          </a:effectRef>
+          <a:fontRef idx="minor">
+            <a:schemeClr val="lt1"/>
+          </a:fontRef>
+        </p:style>
+        <p:txBody>
+          <a:bodyPr rtlCol="0" anchor="ctr"/>
+          <a:lstStyle/>
+          <a:p>
+            <a:pPr algn="ctr"/>
+            <a:endParaRPr lang="es-AR"/>
+          </a:p>
+        </p:txBody>
+      </p:sp>
+      <p:sp>
+        <p:nvSpPr>
+          <p:cNvPr id="48" name="47 Rectángulo"/>
+          <p:cNvSpPr/>
+          <p:nvPr/>
+        </p:nvSpPr>
+        <p:spPr>
+          <a:xfrm>
+            <a:off x="6929454" y="1214422"/>
+            <a:ext cx="785818" cy="357190"/>
+          </a:xfrm>
+          <a:prstGeom prst="rect">
+            <a:avLst/>
+          </a:prstGeom>
+          <a:solidFill>
+            <a:schemeClr val="bg1"/>
+          </a:solidFill>
+          <a:ln>
+            <a:noFill/>
+          </a:ln>
+        </p:spPr>
+        <p:style>
+          <a:lnRef idx="2">
+            <a:schemeClr val="accent1">
+              <a:shade val="50000"/>
+            </a:schemeClr>
+          </a:lnRef>
+          <a:fillRef idx="1">
+            <a:schemeClr val="accent1"/>
+          </a:fillRef>
+          <a:effectRef idx="0">
+            <a:schemeClr val="accent1"/>
+          </a:effectRef>
+          <a:fontRef idx="minor">
+            <a:schemeClr val="lt1"/>
+          </a:fontRef>
+        </p:style>
+        <p:txBody>
+          <a:bodyPr rtlCol="0" anchor="ctr"/>
+          <a:lstStyle/>
+          <a:p>
+            <a:pPr algn="ctr"/>
+            <a:endParaRPr lang="es-AR"/>
+          </a:p>
+        </p:txBody>
+      </p:sp>
+      <p:pic>
+        <p:nvPicPr>
+          <p:cNvPr id="1035" name="Picture 11" descr="C:\Users\PC ACER\Dropbox\botinazul.png"/>
+          <p:cNvPicPr>
+            <a:picLocks noChangeAspect="1" noChangeArrowheads="1"/>
+          </p:cNvPicPr>
+          <p:nvPr/>
+        </p:nvPicPr>
+        <p:blipFill>
+          <a:blip r:embed="rId10" cstate="print"/>
+          <a:srcRect/>
+          <a:stretch>
+            <a:fillRect/>
+          </a:stretch>
+        </p:blipFill>
+        <p:spPr bwMode="auto">
+          <a:xfrm>
+            <a:off x="7143768" y="1214422"/>
+            <a:ext cx="357190" cy="357190"/>
+          </a:xfrm>
+          <a:prstGeom prst="rect">
+            <a:avLst/>
+          </a:prstGeom>
+          <a:noFill/>
+        </p:spPr>
+      </p:pic>
+      <p:sp>
+        <p:nvSpPr>
+          <p:cNvPr id="49" name="48 Rectángulo"/>
+          <p:cNvSpPr/>
+          <p:nvPr/>
+        </p:nvSpPr>
+        <p:spPr>
+          <a:xfrm>
+            <a:off x="6929454" y="3357562"/>
+            <a:ext cx="785818" cy="357190"/>
+          </a:xfrm>
+          <a:prstGeom prst="rect">
+            <a:avLst/>
+          </a:prstGeom>
+          <a:solidFill>
+            <a:schemeClr val="bg1"/>
+          </a:solidFill>
+          <a:ln>
+            <a:noFill/>
+          </a:ln>
+        </p:spPr>
+        <p:style>
+          <a:lnRef idx="2">
+            <a:schemeClr val="accent1">
+              <a:shade val="50000"/>
+            </a:schemeClr>
+          </a:lnRef>
+          <a:fillRef idx="1">
+            <a:schemeClr val="accent1"/>
+          </a:fillRef>
+          <a:effectRef idx="0">
+            <a:schemeClr val="accent1"/>
+          </a:effectRef>
+          <a:fontRef idx="minor">
+            <a:schemeClr val="lt1"/>
+          </a:fontRef>
+        </p:style>
+        <p:txBody>
+          <a:bodyPr rtlCol="0" anchor="ctr"/>
+          <a:lstStyle/>
+          <a:p>
+            <a:pPr algn="ctr"/>
+            <a:endParaRPr lang="es-AR"/>
+          </a:p>
+        </p:txBody>
+      </p:sp>
+      <p:sp>
+        <p:nvSpPr>
+          <p:cNvPr id="50" name="49 Rectángulo"/>
+          <p:cNvSpPr/>
+          <p:nvPr/>
+        </p:nvSpPr>
+        <p:spPr>
+          <a:xfrm>
+            <a:off x="6858016" y="5643578"/>
+            <a:ext cx="785818" cy="428628"/>
+          </a:xfrm>
+          <a:prstGeom prst="rect">
+            <a:avLst/>
+          </a:prstGeom>
+          <a:solidFill>
+            <a:schemeClr val="bg1"/>
+          </a:solidFill>
+          <a:ln>
+            <a:noFill/>
+          </a:ln>
+        </p:spPr>
+        <p:style>
+          <a:lnRef idx="2">
+            <a:schemeClr val="accent1">
+              <a:shade val="50000"/>
+            </a:schemeClr>
+          </a:lnRef>
+          <a:fillRef idx="1">
+            <a:schemeClr val="accent1"/>
+          </a:fillRef>
+          <a:effectRef idx="0">
+            <a:schemeClr val="accent1"/>
+          </a:effectRef>
+          <a:fontRef idx="minor">
+            <a:schemeClr val="lt1"/>
+          </a:fontRef>
+        </p:style>
+        <p:txBody>
+          <a:bodyPr rtlCol="0" anchor="ctr"/>
+          <a:lstStyle/>
+          <a:p>
+            <a:pPr algn="ctr"/>
+            <a:endParaRPr lang="es-AR"/>
+          </a:p>
+        </p:txBody>
+      </p:sp>
+      <p:pic>
+        <p:nvPicPr>
+          <p:cNvPr id="1036" name="Picture 12" descr="C:\Users\PC ACER\Dropbox\botinnegro.png"/>
+          <p:cNvPicPr>
+            <a:picLocks noChangeAspect="1" noChangeArrowheads="1"/>
+          </p:cNvPicPr>
+          <p:nvPr/>
+        </p:nvPicPr>
+        <p:blipFill>
+          <a:blip r:embed="rId11" cstate="print"/>
+          <a:srcRect/>
+          <a:stretch>
+            <a:fillRect/>
+          </a:stretch>
+        </p:blipFill>
+        <p:spPr bwMode="auto">
+          <a:xfrm>
+            <a:off x="7072330" y="5643578"/>
+            <a:ext cx="428628" cy="428628"/>
+          </a:xfrm>
+          <a:prstGeom prst="rect">
+            <a:avLst/>
+          </a:prstGeom>
+          <a:noFill/>
+        </p:spPr>
+      </p:pic>
+      <p:pic>
+        <p:nvPicPr>
+          <p:cNvPr id="1037" name="Picture 13" descr="C:\Users\PC ACER\Dropbox\remera.png"/>
+          <p:cNvPicPr>
+            <a:picLocks noChangeAspect="1" noChangeArrowheads="1"/>
+          </p:cNvPicPr>
+          <p:nvPr/>
+        </p:nvPicPr>
+        <p:blipFill>
+          <a:blip r:embed="rId12" cstate="print"/>
+          <a:srcRect/>
+          <a:stretch>
+            <a:fillRect/>
+          </a:stretch>
+        </p:blipFill>
+        <p:spPr bwMode="auto">
+          <a:xfrm>
+            <a:off x="7143768" y="3357562"/>
+            <a:ext cx="357190" cy="357190"/>
           </a:xfrm>
           <a:prstGeom prst="rect">
             <a:avLst/>
@@ -9008,13 +9360,184 @@
                 <a:ea typeface="Verdana" pitchFamily="34" charset="0"/>
                 <a:cs typeface="Verdana" pitchFamily="34" charset="0"/>
               </a:rPr>
+              <a:t>Preguntas?</a:t>
+            </a:r>
+          </a:p>
+        </p:txBody>
+      </p:sp>
+      <p:pic>
+        <p:nvPicPr>
+          <p:cNvPr id="10" name="Picture 2" descr="D:\ProyectoFinal\Proyecto final\Logo_OpticalMarketing\iso2.png"/>
+          <p:cNvPicPr>
+            <a:picLocks noChangeAspect="1" noChangeArrowheads="1"/>
+          </p:cNvPicPr>
+          <p:nvPr/>
+        </p:nvPicPr>
+        <p:blipFill>
+          <a:blip r:embed="rId3" cstate="print"/>
+          <a:srcRect/>
+          <a:stretch>
+            <a:fillRect/>
+          </a:stretch>
+        </p:blipFill>
+        <p:spPr bwMode="auto">
+          <a:xfrm>
+            <a:off x="680624" y="2143116"/>
+            <a:ext cx="1605360" cy="1643074"/>
+          </a:xfrm>
+          <a:prstGeom prst="rect">
+            <a:avLst/>
+          </a:prstGeom>
+          <a:noFill/>
+        </p:spPr>
+      </p:pic>
+      <p:sp>
+        <p:nvSpPr>
+          <p:cNvPr id="47106" name="AutoShape 2" descr="Imágenes integradas 1"/>
+          <p:cNvSpPr>
+            <a:spLocks noChangeAspect="1" noChangeArrowheads="1"/>
+          </p:cNvSpPr>
+          <p:nvPr/>
+        </p:nvSpPr>
+        <p:spPr bwMode="auto">
+          <a:xfrm>
+            <a:off x="155575" y="-144463"/>
+            <a:ext cx="304800" cy="304801"/>
+          </a:xfrm>
+          <a:prstGeom prst="rect">
+            <a:avLst/>
+          </a:prstGeom>
+          <a:noFill/>
+        </p:spPr>
+        <p:txBody>
+          <a:bodyPr vert="horz" wrap="square" lIns="91440" tIns="45720" rIns="91440" bIns="45720" numCol="1" anchor="t" anchorCtr="0" compatLnSpc="1">
+            <a:prstTxWarp prst="textNoShape">
+              <a:avLst/>
+            </a:prstTxWarp>
+          </a:bodyPr>
+          <a:lstStyle/>
+          <a:p>
+            <a:endParaRPr lang="es-AR"/>
+          </a:p>
+        </p:txBody>
+      </p:sp>
+      <p:sp>
+        <p:nvSpPr>
+          <p:cNvPr id="47108" name="AutoShape 4" descr="Imágenes integradas 1"/>
+          <p:cNvSpPr>
+            <a:spLocks noChangeAspect="1" noChangeArrowheads="1"/>
+          </p:cNvSpPr>
+          <p:nvPr/>
+        </p:nvSpPr>
+        <p:spPr bwMode="auto">
+          <a:xfrm>
+            <a:off x="155575" y="-144463"/>
+            <a:ext cx="304800" cy="304801"/>
+          </a:xfrm>
+          <a:prstGeom prst="rect">
+            <a:avLst/>
+          </a:prstGeom>
+          <a:noFill/>
+        </p:spPr>
+        <p:txBody>
+          <a:bodyPr vert="horz" wrap="square" lIns="91440" tIns="45720" rIns="91440" bIns="45720" numCol="1" anchor="t" anchorCtr="0" compatLnSpc="1">
+            <a:prstTxWarp prst="textNoShape">
+              <a:avLst/>
+            </a:prstTxWarp>
+          </a:bodyPr>
+          <a:lstStyle/>
+          <a:p>
+            <a:endParaRPr lang="es-AR"/>
+          </a:p>
+        </p:txBody>
+      </p:sp>
+      <p:pic>
+        <p:nvPicPr>
+          <p:cNvPr id="8" name="Picture 2" descr="D:\ProyectoFinal\Proyecto final\Logo_OpticalMarketing\iso2.png"/>
+          <p:cNvPicPr>
+            <a:picLocks noChangeAspect="1" noChangeArrowheads="1"/>
+          </p:cNvPicPr>
+          <p:nvPr/>
+        </p:nvPicPr>
+        <p:blipFill>
+          <a:blip r:embed="rId3" cstate="print"/>
+          <a:srcRect/>
+          <a:stretch>
+            <a:fillRect/>
+          </a:stretch>
+        </p:blipFill>
+        <p:spPr bwMode="auto">
+          <a:xfrm flipH="1">
+            <a:off x="6572264" y="2143116"/>
+            <a:ext cx="1537912" cy="1643074"/>
+          </a:xfrm>
+          <a:prstGeom prst="rect">
+            <a:avLst/>
+          </a:prstGeom>
+          <a:noFill/>
+        </p:spPr>
+      </p:pic>
+    </p:spTree>
+  </p:cSld>
+  <p:clrMapOvr>
+    <a:masterClrMapping/>
+  </p:clrMapOvr>
+  <p:timing>
+    <p:tnLst>
+      <p:par>
+        <p:cTn id="1" dur="indefinite" restart="never" nodeType="tmRoot"/>
+      </p:par>
+    </p:tnLst>
+  </p:timing>
+</p:sld>
+</file>
+
+<file path=ppt/slides/slide21.xml><?xml version="1.0" encoding="utf-8"?>
+<p:sld xmlns:a="http://schemas.openxmlformats.org/drawingml/2006/main" xmlns:r="http://schemas.openxmlformats.org/officeDocument/2006/relationships" xmlns:p="http://schemas.openxmlformats.org/presentationml/2006/main">
+  <p:cSld>
+    <p:spTree>
+      <p:nvGrpSpPr>
+        <p:cNvPr id="1" name=""/>
+        <p:cNvGrpSpPr/>
+        <p:nvPr/>
+      </p:nvGrpSpPr>
+      <p:grpSpPr>
+        <a:xfrm>
+          <a:off x="0" y="0"/>
+          <a:ext cx="0" cy="0"/>
+          <a:chOff x="0" y="0"/>
+          <a:chExt cx="0" cy="0"/>
+        </a:xfrm>
+      </p:grpSpPr>
+      <p:sp>
+        <p:nvSpPr>
+          <p:cNvPr id="9" name="8 Rectángulo"/>
+          <p:cNvSpPr/>
+          <p:nvPr/>
+        </p:nvSpPr>
+        <p:spPr>
+          <a:xfrm>
+            <a:off x="2928926" y="2786058"/>
+            <a:ext cx="3929090" cy="830997"/>
+          </a:xfrm>
+          <a:prstGeom prst="rect">
+            <a:avLst/>
+          </a:prstGeom>
+        </p:spPr>
+        <p:txBody>
+          <a:bodyPr wrap="square">
+            <a:spAutoFit/>
+          </a:bodyPr>
+          <a:lstStyle/>
+          <a:p>
+            <a:r>
+              <a:rPr lang="es-AR" sz="4800" dirty="0" smtClean="0">
+                <a:latin typeface="Verdana" pitchFamily="34" charset="0"/>
+                <a:ea typeface="Verdana" pitchFamily="34" charset="0"/>
+                <a:cs typeface="Verdana" pitchFamily="34" charset="0"/>
+              </a:rPr>
               <a:t>GRACIAS!</a:t>
             </a:r>
-            <a:endParaRPr lang="es-AR" sz="4800" dirty="0" smtClean="0">
-              <a:latin typeface="Verdana" pitchFamily="34" charset="0"/>
-              <a:ea typeface="Verdana" pitchFamily="34" charset="0"/>
-              <a:cs typeface="Verdana" pitchFamily="34" charset="0"/>
-            </a:endParaRPr>
           </a:p>
         </p:txBody>
       </p:sp>

</xml_diff>